<commit_message>
Updated Builder PPT; Added draft Singleton PPT.
</commit_message>
<xml_diff>
--- a/_Doc/DesignPattern.P2.Creational(Bulder).pptx
+++ b/_Doc/DesignPattern.P2.Creational(Bulder).pptx
@@ -212,7 +212,7 @@
           <a:p>
             <a:fld id="{E18479FA-1253-41AA-8ABD-DCCC0F2E9FAF}" type="datetimeFigureOut">
               <a:rPr lang="en-US" smtClean="0"/>
-              <a:t>4/14/2015</a:t>
+              <a:t>4/16/2015</a:t>
             </a:fld>
             <a:endParaRPr lang="en-US"/>
           </a:p>
@@ -1126,7 +1126,7 @@
           <a:p>
             <a:fld id="{530820CF-B880-4189-942D-D702A7CBA730}" type="datetimeFigureOut">
               <a:rPr lang="zh-CN" altLang="en-US" smtClean="0"/>
-              <a:t>2015/4/14</a:t>
+              <a:t>2015/4/16</a:t>
             </a:fld>
             <a:endParaRPr lang="zh-CN" altLang="en-US"/>
           </a:p>
@@ -1291,7 +1291,7 @@
           <a:p>
             <a:fld id="{530820CF-B880-4189-942D-D702A7CBA730}" type="datetimeFigureOut">
               <a:rPr lang="zh-CN" altLang="en-US" smtClean="0"/>
-              <a:t>2015/4/14</a:t>
+              <a:t>2015/4/16</a:t>
             </a:fld>
             <a:endParaRPr lang="zh-CN" altLang="en-US"/>
           </a:p>
@@ -1466,7 +1466,7 @@
           <a:p>
             <a:fld id="{530820CF-B880-4189-942D-D702A7CBA730}" type="datetimeFigureOut">
               <a:rPr lang="zh-CN" altLang="en-US" smtClean="0"/>
-              <a:t>2015/4/14</a:t>
+              <a:t>2015/4/16</a:t>
             </a:fld>
             <a:endParaRPr lang="zh-CN" altLang="en-US"/>
           </a:p>
@@ -1631,7 +1631,7 @@
           <a:p>
             <a:fld id="{530820CF-B880-4189-942D-D702A7CBA730}" type="datetimeFigureOut">
               <a:rPr lang="zh-CN" altLang="en-US" smtClean="0"/>
-              <a:t>2015/4/14</a:t>
+              <a:t>2015/4/16</a:t>
             </a:fld>
             <a:endParaRPr lang="zh-CN" altLang="en-US"/>
           </a:p>
@@ -1872,7 +1872,7 @@
           <a:p>
             <a:fld id="{530820CF-B880-4189-942D-D702A7CBA730}" type="datetimeFigureOut">
               <a:rPr lang="zh-CN" altLang="en-US" smtClean="0"/>
-              <a:t>2015/4/14</a:t>
+              <a:t>2015/4/16</a:t>
             </a:fld>
             <a:endParaRPr lang="zh-CN" altLang="en-US"/>
           </a:p>
@@ -2155,7 +2155,7 @@
           <a:p>
             <a:fld id="{530820CF-B880-4189-942D-D702A7CBA730}" type="datetimeFigureOut">
               <a:rPr lang="zh-CN" altLang="en-US" smtClean="0"/>
-              <a:t>2015/4/14</a:t>
+              <a:t>2015/4/16</a:t>
             </a:fld>
             <a:endParaRPr lang="zh-CN" altLang="en-US"/>
           </a:p>
@@ -2572,7 +2572,7 @@
           <a:p>
             <a:fld id="{530820CF-B880-4189-942D-D702A7CBA730}" type="datetimeFigureOut">
               <a:rPr lang="zh-CN" altLang="en-US" smtClean="0"/>
-              <a:t>2015/4/14</a:t>
+              <a:t>2015/4/16</a:t>
             </a:fld>
             <a:endParaRPr lang="zh-CN" altLang="en-US"/>
           </a:p>
@@ -2685,7 +2685,7 @@
           <a:p>
             <a:fld id="{530820CF-B880-4189-942D-D702A7CBA730}" type="datetimeFigureOut">
               <a:rPr lang="zh-CN" altLang="en-US" smtClean="0"/>
-              <a:t>2015/4/14</a:t>
+              <a:t>2015/4/16</a:t>
             </a:fld>
             <a:endParaRPr lang="zh-CN" altLang="en-US"/>
           </a:p>
@@ -2775,7 +2775,7 @@
           <a:p>
             <a:fld id="{530820CF-B880-4189-942D-D702A7CBA730}" type="datetimeFigureOut">
               <a:rPr lang="zh-CN" altLang="en-US" smtClean="0"/>
-              <a:t>2015/4/14</a:t>
+              <a:t>2015/4/16</a:t>
             </a:fld>
             <a:endParaRPr lang="zh-CN" altLang="en-US"/>
           </a:p>
@@ -3047,7 +3047,7 @@
           <a:p>
             <a:fld id="{530820CF-B880-4189-942D-D702A7CBA730}" type="datetimeFigureOut">
               <a:rPr lang="zh-CN" altLang="en-US" smtClean="0"/>
-              <a:t>2015/4/14</a:t>
+              <a:t>2015/4/16</a:t>
             </a:fld>
             <a:endParaRPr lang="zh-CN" altLang="en-US"/>
           </a:p>
@@ -3295,7 +3295,7 @@
           <a:p>
             <a:fld id="{530820CF-B880-4189-942D-D702A7CBA730}" type="datetimeFigureOut">
               <a:rPr lang="zh-CN" altLang="en-US" smtClean="0"/>
-              <a:t>2015/4/14</a:t>
+              <a:t>2015/4/16</a:t>
             </a:fld>
             <a:endParaRPr lang="zh-CN" altLang="en-US"/>
           </a:p>
@@ -3503,7 +3503,7 @@
           <a:p>
             <a:fld id="{530820CF-B880-4189-942D-D702A7CBA730}" type="datetimeFigureOut">
               <a:rPr lang="zh-CN" altLang="en-US" smtClean="0"/>
-              <a:t>2015/4/14</a:t>
+              <a:t>2015/4/16</a:t>
             </a:fld>
             <a:endParaRPr lang="zh-CN" altLang="en-US"/>
           </a:p>
@@ -4298,18 +4298,6 @@
               </a:rPr>
               <a:t>ComputerBuilder</a:t>
             </a:r>
-            <a:endParaRPr lang="en-US" altLang="en-US" sz="1700" b="1" spc="50" dirty="0">
-              <a:ln w="12700">
-                <a:noFill/>
-                <a:prstDash val="solid"/>
-              </a:ln>
-              <a:solidFill>
-                <a:schemeClr val="accent4"/>
-              </a:solidFill>
-              <a:latin typeface="+mj-lt"/>
-              <a:ea typeface="+mj-ea"/>
-              <a:cs typeface="+mj-cs"/>
-            </a:endParaRPr>
           </a:p>
         </p:txBody>
       </p:sp>
@@ -4545,18 +4533,6 @@
               </a:rPr>
               <a:t>ComputerBuilder</a:t>
             </a:r>
-            <a:endParaRPr lang="en-US" altLang="en-US" sz="1700" b="1" spc="50" dirty="0">
-              <a:ln w="12700">
-                <a:noFill/>
-                <a:prstDash val="solid"/>
-              </a:ln>
-              <a:solidFill>
-                <a:schemeClr val="accent4"/>
-              </a:solidFill>
-              <a:latin typeface="+mj-lt"/>
-              <a:ea typeface="+mj-ea"/>
-              <a:cs typeface="+mj-cs"/>
-            </a:endParaRPr>
           </a:p>
         </p:txBody>
       </p:sp>
@@ -4796,18 +4772,6 @@
               </a:rPr>
               <a:t>Computer</a:t>
             </a:r>
-            <a:endParaRPr lang="en-US" altLang="en-US" sz="1700" b="1" spc="50" dirty="0">
-              <a:ln w="12700">
-                <a:noFill/>
-                <a:prstDash val="solid"/>
-              </a:ln>
-              <a:solidFill>
-                <a:schemeClr val="accent4"/>
-              </a:solidFill>
-              <a:latin typeface="+mj-lt"/>
-              <a:ea typeface="+mj-ea"/>
-              <a:cs typeface="+mj-cs"/>
-            </a:endParaRPr>
           </a:p>
         </p:txBody>
       </p:sp>
@@ -6277,25 +6241,6 @@
               </a:rPr>
               <a:t>(Participants):</a:t>
             </a:r>
-            <a:endParaRPr lang="en-US" altLang="zh-CN" sz="2100" b="1" spc="50" dirty="0">
-              <a:ln w="12700">
-                <a:noFill/>
-                <a:prstDash val="solid"/>
-              </a:ln>
-              <a:solidFill>
-                <a:schemeClr val="accent4"/>
-              </a:solidFill>
-              <a:effectLst>
-                <a:outerShdw blurRad="38100" dist="38100" dir="2700000" algn="tl">
-                  <a:srgbClr val="000000">
-                    <a:alpha val="43137"/>
-                  </a:srgbClr>
-                </a:outerShdw>
-              </a:effectLst>
-              <a:latin typeface="+mj-lt"/>
-              <a:ea typeface="+mj-ea"/>
-              <a:cs typeface="+mj-cs"/>
-            </a:endParaRPr>
           </a:p>
           <a:p>
             <a:endParaRPr lang="en-US" sz="1900" b="1" spc="50" dirty="0">
@@ -6431,22 +6376,7 @@
                 <a:ea typeface="+mj-ea"/>
                 <a:cs typeface="+mj-cs"/>
               </a:rPr>
-              <a:t>对象</a:t>
-            </a:r>
-            <a:r>
-              <a:rPr lang="zh-CN" altLang="en-US" sz="1400" b="1" spc="50" dirty="0">
-                <a:ln w="12700">
-                  <a:noFill/>
-                  <a:prstDash val="solid"/>
-                </a:ln>
-                <a:solidFill>
-                  <a:schemeClr val="accent4"/>
-                </a:solidFill>
-                <a:latin typeface="+mj-lt"/>
-                <a:ea typeface="+mj-ea"/>
-                <a:cs typeface="+mj-cs"/>
-              </a:rPr>
-              <a:t>的各个部件指定抽象</a:t>
+              <a:t>对象的各个部件指定抽象</a:t>
             </a:r>
             <a:r>
               <a:rPr lang="zh-CN" altLang="en-US" sz="1400" b="1" spc="50" dirty="0" smtClean="0">
@@ -9081,8 +9011,8 @@
         </p:nvSpPr>
         <p:spPr>
           <a:xfrm>
-            <a:off x="683568" y="1412776"/>
-            <a:ext cx="7776864" cy="4248472"/>
+            <a:off x="683568" y="1556792"/>
+            <a:ext cx="7776864" cy="5040560"/>
           </a:xfrm>
           <a:prstGeom prst="rect">
             <a:avLst/>
@@ -9090,7 +9020,7 @@
         </p:spPr>
         <p:txBody>
           <a:bodyPr vert="horz" rtlCol="0" anchor="ctr">
-            <a:normAutofit fontScale="92500" lnSpcReduction="10000"/>
+            <a:normAutofit fontScale="77500" lnSpcReduction="20000"/>
             <a:scene3d>
               <a:camera prst="orthographicFront"/>
               <a:lightRig rig="soft" dir="t"/>
@@ -9107,7 +9037,7 @@
               </a:spcBef>
             </a:pPr>
             <a:r>
-              <a:rPr lang="zh-CN" altLang="en-US" sz="1900" b="1" spc="50" dirty="0">
+              <a:rPr lang="zh-CN" altLang="en-US" sz="2100" b="1" spc="50" dirty="0">
                 <a:ln w="12700">
                   <a:noFill/>
                   <a:prstDash val="solid"/>
@@ -9129,7 +9059,7 @@
               <a:t>实现</a:t>
             </a:r>
             <a:r>
-              <a:rPr lang="en-US" altLang="zh-CN" sz="1900" b="1" spc="50" dirty="0" smtClean="0">
+              <a:rPr lang="en-US" altLang="zh-CN" sz="2100" b="1" spc="50" dirty="0" smtClean="0">
                 <a:ln w="12700">
                   <a:noFill/>
                   <a:prstDash val="solid"/>
@@ -9150,7 +9080,28 @@
               </a:rPr>
               <a:t>(Implementation):</a:t>
             </a:r>
-            <a:endParaRPr lang="en-US" altLang="zh-CN" sz="1900" b="1" spc="50" dirty="0">
+            <a:br>
+              <a:rPr lang="en-US" altLang="zh-CN" sz="2100" b="1" spc="50" dirty="0" smtClean="0">
+                <a:ln w="12700">
+                  <a:noFill/>
+                  <a:prstDash val="solid"/>
+                </a:ln>
+                <a:solidFill>
+                  <a:schemeClr val="accent4"/>
+                </a:solidFill>
+                <a:effectLst>
+                  <a:outerShdw blurRad="38100" dist="38100" dir="2700000" algn="tl">
+                    <a:srgbClr val="000000">
+                      <a:alpha val="43137"/>
+                    </a:srgbClr>
+                  </a:outerShdw>
+                </a:effectLst>
+                <a:latin typeface="+mj-lt"/>
+                <a:ea typeface="+mj-ea"/>
+                <a:cs typeface="+mj-cs"/>
+              </a:rPr>
+            </a:br>
+            <a:endParaRPr lang="en-US" altLang="zh-CN" sz="2100" b="1" spc="50" dirty="0">
               <a:ln w="12700">
                 <a:noFill/>
                 <a:prstDash val="solid"/>
@@ -9171,6 +9122,51 @@
             </a:endParaRPr>
           </a:p>
           <a:p>
+            <a:r>
+              <a:rPr lang="zh-CN" altLang="en-US" sz="1600" b="1" spc="50" dirty="0" smtClean="0">
+                <a:ln w="12700">
+                  <a:noFill/>
+                  <a:prstDash val="solid"/>
+                </a:ln>
+                <a:solidFill>
+                  <a:schemeClr val="accent4"/>
+                </a:solidFill>
+                <a:latin typeface="+mj-lt"/>
+                <a:ea typeface="+mj-ea"/>
+                <a:cs typeface="+mj-cs"/>
+              </a:rPr>
+              <a:t>      </a:t>
+            </a:r>
+            <a:r>
+              <a:rPr lang="en-US" altLang="zh-CN" sz="1600" b="1" spc="50" dirty="0" smtClean="0">
+                <a:ln w="12700">
+                  <a:noFill/>
+                  <a:prstDash val="solid"/>
+                </a:ln>
+                <a:solidFill>
+                  <a:schemeClr val="accent4"/>
+                </a:solidFill>
+                <a:latin typeface="+mj-lt"/>
+                <a:ea typeface="+mj-ea"/>
+                <a:cs typeface="+mj-cs"/>
+              </a:rPr>
+              <a:t>- Builder</a:t>
+            </a:r>
+            <a:r>
+              <a:rPr lang="zh-CN" altLang="en-US" sz="1600" b="1" spc="50" dirty="0" smtClean="0">
+                <a:ln w="12700">
+                  <a:noFill/>
+                  <a:prstDash val="solid"/>
+                </a:ln>
+                <a:solidFill>
+                  <a:schemeClr val="accent4"/>
+                </a:solidFill>
+                <a:latin typeface="+mj-lt"/>
+                <a:ea typeface="+mj-ea"/>
+                <a:cs typeface="+mj-cs"/>
+              </a:rPr>
+              <a:t>的部件构建接口应当具有普遍性</a:t>
+            </a:r>
             <a:endParaRPr lang="en-US" altLang="zh-CN" sz="1600" b="1" spc="50" dirty="0">
               <a:ln w="12700">
                 <a:noFill/>
@@ -9186,21 +9182,6 @@
           </a:p>
           <a:p>
             <a:r>
-              <a:rPr lang="zh-CN" altLang="en-US" sz="1600" b="1" spc="50" dirty="0" smtClean="0">
-                <a:ln w="12700">
-                  <a:noFill/>
-                  <a:prstDash val="solid"/>
-                </a:ln>
-                <a:solidFill>
-                  <a:schemeClr val="accent4"/>
-                </a:solidFill>
-                <a:latin typeface="+mj-lt"/>
-                <a:ea typeface="+mj-ea"/>
-                <a:cs typeface="+mj-cs"/>
-              </a:rPr>
-              <a:t>      </a:t>
-            </a:r>
-            <a:r>
               <a:rPr lang="en-US" altLang="zh-CN" sz="1600" b="1" spc="50" dirty="0" smtClean="0">
                 <a:ln w="12700">
                   <a:noFill/>
@@ -9213,10 +9194,237 @@
                 <a:ea typeface="+mj-ea"/>
                 <a:cs typeface="+mj-cs"/>
               </a:rPr>
-              <a:t>- </a:t>
-            </a:r>
-            <a:r>
-              <a:rPr lang="en-US" altLang="zh-CN" sz="1600" b="1" spc="50" dirty="0" smtClean="0">
+              <a:t>	</a:t>
+            </a:r>
+          </a:p>
+          <a:p>
+            <a:r>
+              <a:rPr lang="en-US" altLang="zh-CN" sz="1600" spc="50" dirty="0">
+                <a:ln w="12700">
+                  <a:noFill/>
+                  <a:prstDash val="solid"/>
+                </a:ln>
+                <a:solidFill>
+                  <a:schemeClr val="accent4"/>
+                </a:solidFill>
+                <a:latin typeface="+mj-lt"/>
+                <a:ea typeface="+mj-ea"/>
+                <a:cs typeface="+mj-cs"/>
+              </a:rPr>
+              <a:t>	</a:t>
+            </a:r>
+            <a:r>
+              <a:rPr lang="en-US" altLang="zh-CN" sz="1600" spc="50" dirty="0" smtClean="0">
+                <a:ln w="12700">
+                  <a:noFill/>
+                  <a:prstDash val="solid"/>
+                </a:ln>
+                <a:solidFill>
+                  <a:schemeClr val="accent4"/>
+                </a:solidFill>
+                <a:latin typeface="+mj-lt"/>
+                <a:ea typeface="+mj-ea"/>
+                <a:cs typeface="+mj-cs"/>
+              </a:rPr>
+              <a:t>Computer</a:t>
+            </a:r>
+            <a:r>
+              <a:rPr lang="zh-CN" altLang="en-US" sz="1600" spc="50" dirty="0" smtClean="0">
+                <a:ln w="12700">
+                  <a:noFill/>
+                  <a:prstDash val="solid"/>
+                </a:ln>
+                <a:solidFill>
+                  <a:schemeClr val="accent4"/>
+                </a:solidFill>
+                <a:latin typeface="+mj-lt"/>
+                <a:ea typeface="+mj-ea"/>
+                <a:cs typeface="+mj-cs"/>
+              </a:rPr>
+              <a:t>例子的构造部件之间不存在依赖，只需返回</a:t>
+            </a:r>
+            <a:r>
+              <a:rPr lang="en-US" altLang="zh-CN" sz="1600" spc="50" dirty="0" smtClean="0">
+                <a:ln w="12700">
+                  <a:noFill/>
+                  <a:prstDash val="solid"/>
+                </a:ln>
+                <a:solidFill>
+                  <a:schemeClr val="accent4"/>
+                </a:solidFill>
+                <a:latin typeface="+mj-lt"/>
+                <a:ea typeface="+mj-ea"/>
+                <a:cs typeface="+mj-cs"/>
+              </a:rPr>
+              <a:t>void</a:t>
+            </a:r>
+          </a:p>
+          <a:p>
+            <a:endParaRPr lang="en-US" altLang="zh-CN" sz="1600" spc="50" dirty="0" smtClean="0">
+              <a:ln w="12700">
+                <a:noFill/>
+                <a:prstDash val="solid"/>
+              </a:ln>
+              <a:solidFill>
+                <a:schemeClr val="accent4"/>
+              </a:solidFill>
+              <a:latin typeface="+mj-lt"/>
+              <a:ea typeface="+mj-ea"/>
+              <a:cs typeface="+mj-cs"/>
+            </a:endParaRPr>
+          </a:p>
+          <a:p>
+            <a:r>
+              <a:rPr lang="en-US" altLang="zh-CN" sz="1600" spc="50" dirty="0">
+                <a:ln w="12700">
+                  <a:noFill/>
+                  <a:prstDash val="solid"/>
+                </a:ln>
+                <a:solidFill>
+                  <a:schemeClr val="accent4"/>
+                </a:solidFill>
+                <a:latin typeface="+mj-lt"/>
+                <a:ea typeface="+mj-ea"/>
+                <a:cs typeface="+mj-cs"/>
+              </a:rPr>
+              <a:t> </a:t>
+            </a:r>
+            <a:r>
+              <a:rPr lang="en-US" altLang="zh-CN" sz="1600" spc="50" dirty="0" smtClean="0">
+                <a:ln w="12700">
+                  <a:noFill/>
+                  <a:prstDash val="solid"/>
+                </a:ln>
+                <a:solidFill>
+                  <a:schemeClr val="accent4"/>
+                </a:solidFill>
+                <a:latin typeface="+mj-lt"/>
+                <a:ea typeface="+mj-ea"/>
+                <a:cs typeface="+mj-cs"/>
+              </a:rPr>
+              <a:t>             </a:t>
+            </a:r>
+            <a:r>
+              <a:rPr lang="en-US" altLang="zh-CN" sz="1600" spc="50" dirty="0">
+                <a:ln w="12700">
+                  <a:noFill/>
+                  <a:prstDash val="solid"/>
+                </a:ln>
+                <a:solidFill>
+                  <a:schemeClr val="accent4"/>
+                </a:solidFill>
+                <a:latin typeface="+mj-lt"/>
+                <a:ea typeface="+mj-ea"/>
+                <a:cs typeface="+mj-cs"/>
+              </a:rPr>
+              <a:t>	</a:t>
+            </a:r>
+            <a:r>
+              <a:rPr lang="zh-CN" altLang="en-US" sz="1600" spc="50" dirty="0" smtClean="0">
+                <a:ln w="12700">
+                  <a:noFill/>
+                  <a:prstDash val="solid"/>
+                </a:ln>
+                <a:solidFill>
+                  <a:schemeClr val="accent4"/>
+                </a:solidFill>
+                <a:latin typeface="+mj-lt"/>
+                <a:ea typeface="+mj-ea"/>
+                <a:cs typeface="+mj-cs"/>
+              </a:rPr>
+              <a:t>更一般的，可能构造步骤依赖于之前已构造部件，即非</a:t>
+            </a:r>
+            <a:r>
+              <a:rPr lang="en-US" altLang="zh-CN" sz="1600" spc="50" dirty="0" smtClean="0">
+                <a:ln w="12700">
+                  <a:noFill/>
+                  <a:prstDash val="solid"/>
+                </a:ln>
+                <a:solidFill>
+                  <a:schemeClr val="accent4"/>
+                </a:solidFill>
+                <a:latin typeface="+mj-lt"/>
+                <a:ea typeface="+mj-ea"/>
+                <a:cs typeface="+mj-cs"/>
+              </a:rPr>
+              <a:t>void</a:t>
+            </a:r>
+            <a:r>
+              <a:rPr lang="zh-CN" altLang="en-US" sz="1600" spc="50" dirty="0" smtClean="0">
+                <a:ln w="12700">
+                  <a:noFill/>
+                  <a:prstDash val="solid"/>
+                </a:ln>
+                <a:solidFill>
+                  <a:schemeClr val="accent4"/>
+                </a:solidFill>
+                <a:latin typeface="+mj-lt"/>
+                <a:ea typeface="+mj-ea"/>
+                <a:cs typeface="+mj-cs"/>
+              </a:rPr>
+              <a:t>（部件模型）</a:t>
+            </a:r>
+            <a:endParaRPr lang="en-US" altLang="zh-CN" sz="1600" spc="50" dirty="0" smtClean="0">
+              <a:ln w="12700">
+                <a:noFill/>
+                <a:prstDash val="solid"/>
+              </a:ln>
+              <a:solidFill>
+                <a:schemeClr val="accent4"/>
+              </a:solidFill>
+              <a:latin typeface="+mj-lt"/>
+              <a:ea typeface="+mj-ea"/>
+              <a:cs typeface="+mj-cs"/>
+            </a:endParaRPr>
+          </a:p>
+          <a:p>
+            <a:r>
+              <a:rPr lang="en-US" altLang="zh-CN" sz="1600" spc="50" dirty="0">
+                <a:ln w="12700">
+                  <a:noFill/>
+                  <a:prstDash val="solid"/>
+                </a:ln>
+                <a:solidFill>
+                  <a:schemeClr val="accent4"/>
+                </a:solidFill>
+                <a:latin typeface="+mj-lt"/>
+                <a:ea typeface="+mj-ea"/>
+                <a:cs typeface="+mj-cs"/>
+              </a:rPr>
+              <a:t>	</a:t>
+            </a:r>
+            <a:r>
+              <a:rPr lang="en-US" altLang="zh-CN" sz="1600" spc="50" dirty="0" smtClean="0">
+                <a:ln w="12700">
+                  <a:noFill/>
+                  <a:prstDash val="solid"/>
+                </a:ln>
+                <a:solidFill>
+                  <a:schemeClr val="accent4"/>
+                </a:solidFill>
+                <a:latin typeface="+mj-lt"/>
+                <a:ea typeface="+mj-ea"/>
+                <a:cs typeface="+mj-cs"/>
+              </a:rPr>
+              <a:t>Director</a:t>
+            </a:r>
+            <a:r>
+              <a:rPr lang="zh-CN" altLang="en-US" sz="1600" spc="50" dirty="0" smtClean="0">
+                <a:ln w="12700">
+                  <a:noFill/>
+                  <a:prstDash val="solid"/>
+                </a:ln>
+                <a:solidFill>
+                  <a:schemeClr val="accent4"/>
+                </a:solidFill>
+                <a:latin typeface="+mj-lt"/>
+                <a:ea typeface="+mj-ea"/>
+                <a:cs typeface="+mj-cs"/>
+              </a:rPr>
+              <a:t>接收</a:t>
+            </a:r>
+            <a:r>
+              <a:rPr lang="en-US" altLang="zh-CN" sz="1600" spc="50" dirty="0" smtClean="0">
                 <a:ln w="12700">
                   <a:noFill/>
                   <a:prstDash val="solid"/>
@@ -9231,20 +9439,93 @@
               <a:t>Builder</a:t>
             </a:r>
             <a:r>
-              <a:rPr lang="zh-CN" altLang="en-US" sz="1600" b="1" spc="50" dirty="0" smtClean="0">
-                <a:ln w="12700">
-                  <a:noFill/>
-                  <a:prstDash val="solid"/>
-                </a:ln>
-                <a:solidFill>
-                  <a:schemeClr val="accent4"/>
-                </a:solidFill>
-                <a:latin typeface="+mj-lt"/>
-                <a:ea typeface="+mj-ea"/>
-                <a:cs typeface="+mj-cs"/>
-              </a:rPr>
-              <a:t>的部件构建接口应当具有普遍性</a:t>
-            </a:r>
+              <a:rPr lang="zh-CN" altLang="en-US" sz="1600" spc="50" dirty="0" smtClean="0">
+                <a:ln w="12700">
+                  <a:noFill/>
+                  <a:prstDash val="solid"/>
+                </a:ln>
+                <a:solidFill>
+                  <a:schemeClr val="accent4"/>
+                </a:solidFill>
+                <a:latin typeface="+mj-lt"/>
+                <a:ea typeface="+mj-ea"/>
+                <a:cs typeface="+mj-cs"/>
+              </a:rPr>
+              <a:t>返回的部件模型再传入</a:t>
+            </a:r>
+            <a:r>
+              <a:rPr lang="en-US" altLang="zh-CN" sz="1600" spc="50" dirty="0" smtClean="0">
+                <a:ln w="12700">
+                  <a:noFill/>
+                  <a:prstDash val="solid"/>
+                </a:ln>
+                <a:solidFill>
+                  <a:schemeClr val="accent4"/>
+                </a:solidFill>
+                <a:latin typeface="+mj-lt"/>
+                <a:ea typeface="+mj-ea"/>
+                <a:cs typeface="+mj-cs"/>
+              </a:rPr>
+              <a:t>Builder</a:t>
+            </a:r>
+            <a:r>
+              <a:rPr lang="zh-CN" altLang="en-US" sz="1600" spc="50" dirty="0" smtClean="0">
+                <a:ln w="12700">
+                  <a:noFill/>
+                  <a:prstDash val="solid"/>
+                </a:ln>
+                <a:solidFill>
+                  <a:schemeClr val="accent4"/>
+                </a:solidFill>
+                <a:latin typeface="+mj-lt"/>
+                <a:ea typeface="+mj-ea"/>
+                <a:cs typeface="+mj-cs"/>
+              </a:rPr>
+              <a:t>使得构造步骤得以</a:t>
+            </a:r>
+            <a:r>
+              <a:rPr lang="zh-CN" altLang="en-US" sz="1600" spc="50" dirty="0" smtClean="0">
+                <a:ln w="12700">
+                  <a:noFill/>
+                  <a:prstDash val="solid"/>
+                </a:ln>
+                <a:solidFill>
+                  <a:schemeClr val="accent4"/>
+                </a:solidFill>
+                <a:latin typeface="+mj-lt"/>
+                <a:ea typeface="+mj-ea"/>
+                <a:cs typeface="+mj-cs"/>
+              </a:rPr>
+              <a:t>继续</a:t>
+            </a:r>
+            <a:endParaRPr lang="en-US" altLang="zh-CN" sz="1600" spc="50" dirty="0" smtClean="0">
+              <a:ln w="12700">
+                <a:noFill/>
+                <a:prstDash val="solid"/>
+              </a:ln>
+              <a:solidFill>
+                <a:schemeClr val="accent4"/>
+              </a:solidFill>
+              <a:latin typeface="+mj-lt"/>
+              <a:ea typeface="+mj-ea"/>
+              <a:cs typeface="+mj-cs"/>
+            </a:endParaRPr>
+          </a:p>
+          <a:p>
+            <a:endParaRPr lang="en-US" altLang="zh-CN" sz="1600" spc="50" dirty="0" smtClean="0">
+              <a:ln w="12700">
+                <a:noFill/>
+                <a:prstDash val="solid"/>
+              </a:ln>
+              <a:solidFill>
+                <a:schemeClr val="accent4"/>
+              </a:solidFill>
+              <a:latin typeface="+mj-lt"/>
+              <a:ea typeface="+mj-ea"/>
+              <a:cs typeface="+mj-cs"/>
+            </a:endParaRPr>
+          </a:p>
+          <a:p>
             <a:endParaRPr lang="en-US" altLang="zh-CN" sz="1600" b="1" spc="50" dirty="0">
               <a:ln w="12700">
                 <a:noFill/>
@@ -9260,6 +9541,30 @@
           </a:p>
           <a:p>
             <a:r>
+              <a:rPr lang="zh-CN" altLang="en-US" sz="1600" b="1" spc="50" dirty="0">
+                <a:ln w="12700">
+                  <a:noFill/>
+                  <a:prstDash val="solid"/>
+                </a:ln>
+                <a:solidFill>
+                  <a:schemeClr val="accent4"/>
+                </a:solidFill>
+              </a:rPr>
+              <a:t> </a:t>
+            </a:r>
+            <a:r>
+              <a:rPr lang="zh-CN" altLang="en-US" sz="1600" b="1" spc="50" dirty="0" smtClean="0">
+                <a:ln w="12700">
+                  <a:noFill/>
+                  <a:prstDash val="solid"/>
+                </a:ln>
+                <a:solidFill>
+                  <a:schemeClr val="accent4"/>
+                </a:solidFill>
+              </a:rPr>
+              <a:t>     </a:t>
+            </a:r>
+            <a:r>
               <a:rPr lang="en-US" altLang="zh-CN" sz="1600" b="1" spc="50" dirty="0" smtClean="0">
                 <a:ln w="12700">
                   <a:noFill/>
@@ -9268,29 +9573,61 @@
                 <a:solidFill>
                   <a:schemeClr val="accent4"/>
                 </a:solidFill>
-                <a:latin typeface="+mj-lt"/>
-                <a:ea typeface="+mj-ea"/>
-                <a:cs typeface="+mj-cs"/>
-              </a:rPr>
-              <a:t>	</a:t>
-            </a:r>
-          </a:p>
-          <a:p>
-            <a:r>
-              <a:rPr lang="en-US" altLang="zh-CN" sz="1600" spc="50" dirty="0">
-                <a:ln w="12700">
-                  <a:noFill/>
-                  <a:prstDash val="solid"/>
-                </a:ln>
-                <a:solidFill>
-                  <a:schemeClr val="accent4"/>
-                </a:solidFill>
-                <a:latin typeface="+mj-lt"/>
-                <a:ea typeface="+mj-ea"/>
-                <a:cs typeface="+mj-cs"/>
-              </a:rPr>
-              <a:t>	</a:t>
-            </a:r>
+              </a:rPr>
+              <a:t>- Product</a:t>
+            </a:r>
+            <a:r>
+              <a:rPr lang="zh-CN" altLang="en-US" sz="1600" b="1" spc="50" dirty="0" smtClean="0">
+                <a:ln w="12700">
+                  <a:noFill/>
+                  <a:prstDash val="solid"/>
+                </a:ln>
+                <a:solidFill>
+                  <a:schemeClr val="accent4"/>
+                </a:solidFill>
+              </a:rPr>
+              <a:t>不要求抽象</a:t>
+            </a:r>
+            <a:r>
+              <a:rPr lang="en-US" altLang="zh-CN" sz="1600" b="1" spc="50" dirty="0" smtClean="0">
+                <a:ln w="12700">
+                  <a:noFill/>
+                  <a:prstDash val="solid"/>
+                </a:ln>
+                <a:solidFill>
+                  <a:schemeClr val="accent4"/>
+                </a:solidFill>
+              </a:rPr>
+              <a:t>(Computer)</a:t>
+            </a:r>
+            <a:endParaRPr lang="en-US" altLang="zh-CN" sz="1600" b="1" spc="50" dirty="0" smtClean="0">
+              <a:ln w="12700">
+                <a:noFill/>
+                <a:prstDash val="solid"/>
+              </a:ln>
+              <a:solidFill>
+                <a:schemeClr val="accent4"/>
+              </a:solidFill>
+              <a:latin typeface="+mj-lt"/>
+              <a:ea typeface="+mj-ea"/>
+              <a:cs typeface="+mj-cs"/>
+            </a:endParaRPr>
+          </a:p>
+          <a:p>
+            <a:endParaRPr lang="en-US" altLang="zh-CN" sz="1600" b="1" spc="50" dirty="0">
+              <a:ln w="12700">
+                <a:noFill/>
+                <a:prstDash val="solid"/>
+              </a:ln>
+              <a:solidFill>
+                <a:schemeClr val="accent4"/>
+              </a:solidFill>
+              <a:latin typeface="+mj-lt"/>
+              <a:ea typeface="+mj-ea"/>
+              <a:cs typeface="+mj-cs"/>
+            </a:endParaRPr>
+          </a:p>
+          <a:p>
             <a:r>
               <a:rPr lang="en-US" altLang="zh-CN" sz="1600" spc="50" dirty="0" smtClean="0">
                 <a:ln w="12700">
@@ -9304,7 +9641,7 @@
                 <a:ea typeface="+mj-ea"/>
                 <a:cs typeface="+mj-cs"/>
               </a:rPr>
-              <a:t>Computer</a:t>
+              <a:t>              	Product</a:t>
             </a:r>
             <a:r>
               <a:rPr lang="zh-CN" altLang="en-US" sz="1600" spc="50" dirty="0" smtClean="0">
@@ -9319,25 +9656,38 @@
                 <a:ea typeface="+mj-ea"/>
                 <a:cs typeface="+mj-cs"/>
               </a:rPr>
-              <a:t>例子的构造部件之间不存在依赖，只需返回</a:t>
-            </a:r>
-            <a:r>
-              <a:rPr lang="en-US" altLang="zh-CN" sz="1600" spc="50" dirty="0" smtClean="0">
-                <a:ln w="12700">
-                  <a:noFill/>
-                  <a:prstDash val="solid"/>
-                </a:ln>
-                <a:solidFill>
-                  <a:schemeClr val="accent4"/>
-                </a:solidFill>
-                <a:latin typeface="+mj-lt"/>
-                <a:ea typeface="+mj-ea"/>
-                <a:cs typeface="+mj-cs"/>
-              </a:rPr>
-              <a:t>void</a:t>
-            </a:r>
-          </a:p>
-          <a:p>
+              <a:t>个体之间差异太大（场景更具</a:t>
+            </a:r>
+            <a:r>
+              <a:rPr lang="zh-CN" altLang="en-US" sz="1600" spc="50" dirty="0">
+                <a:ln w="12700">
+                  <a:noFill/>
+                  <a:prstDash val="solid"/>
+                </a:ln>
+                <a:solidFill>
+                  <a:schemeClr val="accent4"/>
+                </a:solidFill>
+                <a:latin typeface="+mj-lt"/>
+                <a:ea typeface="+mj-ea"/>
+                <a:cs typeface="+mj-cs"/>
+              </a:rPr>
+              <a:t>一般性），难于</a:t>
+            </a:r>
+            <a:r>
+              <a:rPr lang="zh-CN" altLang="en-US" sz="1600" spc="50" dirty="0" smtClean="0">
+                <a:ln w="12700">
+                  <a:noFill/>
+                  <a:prstDash val="solid"/>
+                </a:ln>
+                <a:solidFill>
+                  <a:schemeClr val="accent4"/>
+                </a:solidFill>
+                <a:latin typeface="+mj-lt"/>
+                <a:ea typeface="+mj-ea"/>
+                <a:cs typeface="+mj-cs"/>
+              </a:rPr>
+              <a:t>抽象</a:t>
+            </a:r>
             <a:endParaRPr lang="en-US" altLang="zh-CN" sz="1600" spc="50" dirty="0" smtClean="0">
               <a:ln w="12700">
                 <a:noFill/>
@@ -9352,96 +9702,6 @@
             </a:endParaRPr>
           </a:p>
           <a:p>
-            <a:r>
-              <a:rPr lang="en-US" altLang="zh-CN" sz="1600" spc="50" dirty="0">
-                <a:ln w="12700">
-                  <a:noFill/>
-                  <a:prstDash val="solid"/>
-                </a:ln>
-                <a:solidFill>
-                  <a:schemeClr val="accent4"/>
-                </a:solidFill>
-                <a:latin typeface="+mj-lt"/>
-                <a:ea typeface="+mj-ea"/>
-                <a:cs typeface="+mj-cs"/>
-              </a:rPr>
-              <a:t> </a:t>
-            </a:r>
-            <a:r>
-              <a:rPr lang="en-US" altLang="zh-CN" sz="1600" spc="50" dirty="0" smtClean="0">
-                <a:ln w="12700">
-                  <a:noFill/>
-                  <a:prstDash val="solid"/>
-                </a:ln>
-                <a:solidFill>
-                  <a:schemeClr val="accent4"/>
-                </a:solidFill>
-                <a:latin typeface="+mj-lt"/>
-                <a:ea typeface="+mj-ea"/>
-                <a:cs typeface="+mj-cs"/>
-              </a:rPr>
-              <a:t>             </a:t>
-            </a:r>
-            <a:r>
-              <a:rPr lang="en-US" altLang="zh-CN" sz="1600" spc="50" dirty="0">
-                <a:ln w="12700">
-                  <a:noFill/>
-                  <a:prstDash val="solid"/>
-                </a:ln>
-                <a:solidFill>
-                  <a:schemeClr val="accent4"/>
-                </a:solidFill>
-                <a:latin typeface="+mj-lt"/>
-                <a:ea typeface="+mj-ea"/>
-                <a:cs typeface="+mj-cs"/>
-              </a:rPr>
-              <a:t>	</a:t>
-            </a:r>
-            <a:r>
-              <a:rPr lang="zh-CN" altLang="en-US" sz="1600" spc="50" dirty="0" smtClean="0">
-                <a:ln w="12700">
-                  <a:noFill/>
-                  <a:prstDash val="solid"/>
-                </a:ln>
-                <a:solidFill>
-                  <a:schemeClr val="accent4"/>
-                </a:solidFill>
-                <a:latin typeface="+mj-lt"/>
-                <a:ea typeface="+mj-ea"/>
-                <a:cs typeface="+mj-cs"/>
-              </a:rPr>
-              <a:t>更一般的，可能构造步骤依赖于之前已构造部件，即非</a:t>
-            </a:r>
-            <a:r>
-              <a:rPr lang="en-US" altLang="zh-CN" sz="1600" spc="50" dirty="0" smtClean="0">
-                <a:ln w="12700">
-                  <a:noFill/>
-                  <a:prstDash val="solid"/>
-                </a:ln>
-                <a:solidFill>
-                  <a:schemeClr val="accent4"/>
-                </a:solidFill>
-                <a:latin typeface="+mj-lt"/>
-                <a:ea typeface="+mj-ea"/>
-                <a:cs typeface="+mj-cs"/>
-              </a:rPr>
-              <a:t>void</a:t>
-            </a:r>
-            <a:r>
-              <a:rPr lang="zh-CN" altLang="en-US" sz="1600" spc="50" dirty="0" smtClean="0">
-                <a:ln w="12700">
-                  <a:noFill/>
-                  <a:prstDash val="solid"/>
-                </a:ln>
-                <a:solidFill>
-                  <a:schemeClr val="accent4"/>
-                </a:solidFill>
-                <a:latin typeface="+mj-lt"/>
-                <a:ea typeface="+mj-ea"/>
-                <a:cs typeface="+mj-cs"/>
-              </a:rPr>
-              <a:t>（部件模型）</a:t>
-            </a:r>
             <a:endParaRPr lang="en-US" altLang="zh-CN" sz="1600" spc="50" dirty="0" smtClean="0">
               <a:ln w="12700">
                 <a:noFill/>
@@ -9472,6 +9732,21 @@
               <a:t>	</a:t>
             </a:r>
             <a:r>
+              <a:rPr lang="zh-CN" altLang="en-US" sz="1600" spc="50" dirty="0" smtClean="0">
+                <a:ln w="12700">
+                  <a:noFill/>
+                  <a:prstDash val="solid"/>
+                </a:ln>
+                <a:solidFill>
+                  <a:schemeClr val="accent4"/>
+                </a:solidFill>
+                <a:latin typeface="+mj-lt"/>
+                <a:ea typeface="+mj-ea"/>
+                <a:cs typeface="+mj-cs"/>
+              </a:rPr>
+              <a:t>需要知晓不同</a:t>
+            </a:r>
+            <a:r>
               <a:rPr lang="en-US" altLang="zh-CN" sz="1600" spc="50" dirty="0" smtClean="0">
                 <a:ln w="12700">
                   <a:noFill/>
@@ -9484,7 +9759,7 @@
                 <a:ea typeface="+mj-ea"/>
                 <a:cs typeface="+mj-cs"/>
               </a:rPr>
-              <a:t>Director</a:t>
+              <a:t>Product</a:t>
             </a:r>
             <a:r>
               <a:rPr lang="zh-CN" altLang="en-US" sz="1600" spc="50" dirty="0" smtClean="0">
@@ -9499,22 +9774,7 @@
                 <a:ea typeface="+mj-ea"/>
                 <a:cs typeface="+mj-cs"/>
               </a:rPr>
-              <a:t>接收</a:t>
-            </a:r>
-            <a:r>
-              <a:rPr lang="en-US" altLang="zh-CN" sz="1600" spc="50" dirty="0" smtClean="0">
-                <a:ln w="12700">
-                  <a:noFill/>
-                  <a:prstDash val="solid"/>
-                </a:ln>
-                <a:solidFill>
-                  <a:schemeClr val="accent4"/>
-                </a:solidFill>
-                <a:latin typeface="+mj-lt"/>
-                <a:ea typeface="+mj-ea"/>
-                <a:cs typeface="+mj-cs"/>
-              </a:rPr>
-              <a:t>Builder</a:t>
+              <a:t>的具体不同成员，从而采取不同</a:t>
             </a:r>
             <a:r>
               <a:rPr lang="zh-CN" altLang="en-US" sz="1600" spc="50" dirty="0" smtClean="0">
@@ -9529,37 +9789,7 @@
                 <a:ea typeface="+mj-ea"/>
                 <a:cs typeface="+mj-cs"/>
               </a:rPr>
-              <a:t>返回的部件模型再传入</a:t>
-            </a:r>
-            <a:r>
-              <a:rPr lang="en-US" altLang="zh-CN" sz="1600" spc="50" dirty="0" smtClean="0">
-                <a:ln w="12700">
-                  <a:noFill/>
-                  <a:prstDash val="solid"/>
-                </a:ln>
-                <a:solidFill>
-                  <a:schemeClr val="accent4"/>
-                </a:solidFill>
-                <a:latin typeface="+mj-lt"/>
-                <a:ea typeface="+mj-ea"/>
-                <a:cs typeface="+mj-cs"/>
-              </a:rPr>
-              <a:t>Builder</a:t>
-            </a:r>
-            <a:r>
-              <a:rPr lang="zh-CN" altLang="en-US" sz="1600" spc="50" dirty="0" smtClean="0">
-                <a:ln w="12700">
-                  <a:noFill/>
-                  <a:prstDash val="solid"/>
-                </a:ln>
-                <a:solidFill>
-                  <a:schemeClr val="accent4"/>
-                </a:solidFill>
-                <a:latin typeface="+mj-lt"/>
-                <a:ea typeface="+mj-ea"/>
-                <a:cs typeface="+mj-cs"/>
-              </a:rPr>
-              <a:t>使得构造步骤得以继续</a:t>
+              <a:t>操作</a:t>
             </a:r>
             <a:endParaRPr lang="en-US" altLang="zh-CN" sz="1600" spc="50" dirty="0" smtClean="0">
               <a:ln w="12700">
@@ -9575,6 +9805,93 @@
             </a:endParaRPr>
           </a:p>
           <a:p>
+            <a:endParaRPr lang="en-US" altLang="zh-CN" sz="1600" spc="50" dirty="0" smtClean="0">
+              <a:ln w="12700">
+                <a:noFill/>
+                <a:prstDash val="solid"/>
+              </a:ln>
+              <a:solidFill>
+                <a:schemeClr val="accent4"/>
+              </a:solidFill>
+              <a:latin typeface="+mj-lt"/>
+              <a:ea typeface="+mj-ea"/>
+              <a:cs typeface="+mj-cs"/>
+            </a:endParaRPr>
+          </a:p>
+          <a:p>
+            <a:r>
+              <a:rPr lang="en-US" altLang="zh-CN" sz="1600" spc="50" dirty="0">
+                <a:ln w="12700">
+                  <a:noFill/>
+                  <a:prstDash val="solid"/>
+                </a:ln>
+                <a:solidFill>
+                  <a:schemeClr val="accent4"/>
+                </a:solidFill>
+                <a:latin typeface="+mj-lt"/>
+                <a:ea typeface="+mj-ea"/>
+                <a:cs typeface="+mj-cs"/>
+              </a:rPr>
+              <a:t>	</a:t>
+            </a:r>
+            <a:r>
+              <a:rPr lang="zh-CN" altLang="en-US" sz="1600" spc="50" dirty="0" smtClean="0">
+                <a:ln w="12700">
+                  <a:noFill/>
+                  <a:prstDash val="solid"/>
+                </a:ln>
+                <a:solidFill>
+                  <a:schemeClr val="accent4"/>
+                </a:solidFill>
+                <a:latin typeface="+mj-lt"/>
+                <a:ea typeface="+mj-ea"/>
+                <a:cs typeface="+mj-cs"/>
+              </a:rPr>
+              <a:t>对其抽象代价不菲，引入不必要的混乱，亦显僵硬</a:t>
+            </a:r>
+            <a:r>
+              <a:rPr lang="zh-CN" altLang="en-US" sz="1600" spc="50" dirty="0" smtClean="0">
+                <a:ln w="12700">
+                  <a:noFill/>
+                  <a:prstDash val="solid"/>
+                </a:ln>
+                <a:solidFill>
+                  <a:schemeClr val="accent4"/>
+                </a:solidFill>
+                <a:latin typeface="+mj-lt"/>
+                <a:ea typeface="+mj-ea"/>
+                <a:cs typeface="+mj-cs"/>
+              </a:rPr>
+              <a:t>死板</a:t>
+            </a:r>
+            <a:endParaRPr lang="en-US" altLang="zh-CN" sz="1600" spc="50" dirty="0" smtClean="0">
+              <a:ln w="12700">
+                <a:noFill/>
+                <a:prstDash val="solid"/>
+              </a:ln>
+              <a:solidFill>
+                <a:schemeClr val="accent4"/>
+              </a:solidFill>
+              <a:latin typeface="+mj-lt"/>
+              <a:ea typeface="+mj-ea"/>
+              <a:cs typeface="+mj-cs"/>
+            </a:endParaRPr>
+          </a:p>
+          <a:p>
+            <a:endParaRPr lang="en-US" altLang="zh-CN" sz="1600" spc="50" dirty="0" smtClean="0">
+              <a:ln w="12700">
+                <a:noFill/>
+                <a:prstDash val="solid"/>
+              </a:ln>
+              <a:solidFill>
+                <a:schemeClr val="accent4"/>
+              </a:solidFill>
+              <a:latin typeface="+mj-lt"/>
+              <a:ea typeface="+mj-ea"/>
+              <a:cs typeface="+mj-cs"/>
+            </a:endParaRPr>
+          </a:p>
+          <a:p>
             <a:endParaRPr lang="en-US" altLang="zh-CN" sz="1600" b="1" spc="50" dirty="0">
               <a:ln w="12700">
                 <a:noFill/>
@@ -9590,18 +9907,6 @@
           </a:p>
           <a:p>
             <a:r>
-              <a:rPr lang="zh-CN" altLang="en-US" sz="1600" b="1" spc="50" dirty="0">
-                <a:ln w="12700">
-                  <a:noFill/>
-                  <a:prstDash val="solid"/>
-                </a:ln>
-                <a:solidFill>
-                  <a:schemeClr val="accent4"/>
-                </a:solidFill>
-              </a:rPr>
-              <a:t> </a:t>
-            </a:r>
-            <a:r>
               <a:rPr lang="zh-CN" altLang="en-US" sz="1600" b="1" spc="50" dirty="0" smtClean="0">
                 <a:ln w="12700">
                   <a:noFill/>
@@ -9610,8 +9915,11 @@
                 <a:solidFill>
                   <a:schemeClr val="accent4"/>
                 </a:solidFill>
-              </a:rPr>
-              <a:t>     </a:t>
+                <a:latin typeface="+mj-lt"/>
+                <a:ea typeface="+mj-ea"/>
+                <a:cs typeface="+mj-cs"/>
+              </a:rPr>
+              <a:t>      </a:t>
             </a:r>
             <a:r>
               <a:rPr lang="en-US" altLang="zh-CN" sz="1600" b="1" spc="50" dirty="0" smtClean="0">
@@ -9622,10 +9930,28 @@
                 <a:solidFill>
                   <a:schemeClr val="accent4"/>
                 </a:solidFill>
+                <a:latin typeface="+mj-lt"/>
+                <a:ea typeface="+mj-ea"/>
+                <a:cs typeface="+mj-cs"/>
               </a:rPr>
               <a:t>- </a:t>
             </a:r>
             <a:r>
+              <a:rPr lang="zh-CN" altLang="en-US" sz="1600" b="1" spc="50" dirty="0" smtClean="0">
+                <a:ln w="12700">
+                  <a:noFill/>
+                  <a:prstDash val="solid"/>
+                </a:ln>
+                <a:solidFill>
+                  <a:schemeClr val="accent4"/>
+                </a:solidFill>
+                <a:latin typeface="+mj-lt"/>
+                <a:ea typeface="+mj-ea"/>
+                <a:cs typeface="+mj-cs"/>
+              </a:rPr>
+              <a:t>抽象</a:t>
+            </a:r>
+            <a:r>
               <a:rPr lang="en-US" altLang="zh-CN" sz="1600" b="1" spc="50" dirty="0" smtClean="0">
                 <a:ln w="12700">
                   <a:noFill/>
@@ -9634,8 +9960,11 @@
                 <a:solidFill>
                   <a:schemeClr val="accent4"/>
                 </a:solidFill>
-              </a:rPr>
-              <a:t>Product</a:t>
+                <a:latin typeface="+mj-lt"/>
+                <a:ea typeface="+mj-ea"/>
+                <a:cs typeface="+mj-cs"/>
+              </a:rPr>
+              <a:t>Builder</a:t>
             </a:r>
             <a:r>
               <a:rPr lang="zh-CN" altLang="en-US" sz="1600" b="1" spc="50" dirty="0" smtClean="0">
@@ -9646,8 +9975,11 @@
                 <a:solidFill>
                   <a:schemeClr val="accent4"/>
                 </a:solidFill>
-              </a:rPr>
-              <a:t>不要求抽象</a:t>
+                <a:latin typeface="+mj-lt"/>
+                <a:ea typeface="+mj-ea"/>
+                <a:cs typeface="+mj-cs"/>
+              </a:rPr>
+              <a:t>的方法可定义为</a:t>
             </a:r>
             <a:r>
               <a:rPr lang="en-US" altLang="zh-CN" sz="1600" b="1" spc="50" dirty="0" smtClean="0">
@@ -9658,9 +9990,295 @@
                 <a:solidFill>
                   <a:schemeClr val="accent4"/>
                 </a:solidFill>
-              </a:rPr>
-              <a:t>(Computer)</a:t>
-            </a:r>
+                <a:latin typeface="+mj-lt"/>
+                <a:ea typeface="+mj-ea"/>
+                <a:cs typeface="+mj-cs"/>
+              </a:rPr>
+              <a:t>virtual</a:t>
+            </a:r>
+            <a:r>
+              <a:rPr lang="zh-CN" altLang="en-US" sz="1600" b="1" spc="50" dirty="0" smtClean="0">
+                <a:ln w="12700">
+                  <a:noFill/>
+                  <a:prstDash val="solid"/>
+                </a:ln>
+                <a:solidFill>
+                  <a:schemeClr val="accent4"/>
+                </a:solidFill>
+                <a:latin typeface="+mj-lt"/>
+                <a:ea typeface="+mj-ea"/>
+                <a:cs typeface="+mj-cs"/>
+              </a:rPr>
+              <a:t>而不是</a:t>
+            </a:r>
+            <a:r>
+              <a:rPr lang="en-US" altLang="zh-CN" sz="1600" b="1" spc="50" dirty="0" smtClean="0">
+                <a:ln w="12700">
+                  <a:noFill/>
+                  <a:prstDash val="solid"/>
+                </a:ln>
+                <a:solidFill>
+                  <a:schemeClr val="accent4"/>
+                </a:solidFill>
+                <a:latin typeface="+mj-lt"/>
+                <a:ea typeface="+mj-ea"/>
+                <a:cs typeface="+mj-cs"/>
+              </a:rPr>
+              <a:t>abstract</a:t>
+            </a:r>
+            <a:endParaRPr lang="en-US" altLang="zh-CN" sz="1600" b="1" spc="50" dirty="0">
+              <a:ln w="12700">
+                <a:noFill/>
+                <a:prstDash val="solid"/>
+              </a:ln>
+              <a:solidFill>
+                <a:schemeClr val="accent4"/>
+              </a:solidFill>
+              <a:latin typeface="+mj-lt"/>
+              <a:ea typeface="+mj-ea"/>
+              <a:cs typeface="+mj-cs"/>
+            </a:endParaRPr>
+          </a:p>
+          <a:p>
+            <a:r>
+              <a:rPr lang="en-US" altLang="zh-CN" sz="1600" b="1" spc="50" dirty="0" smtClean="0">
+                <a:ln w="12700">
+                  <a:noFill/>
+                  <a:prstDash val="solid"/>
+                </a:ln>
+                <a:solidFill>
+                  <a:schemeClr val="accent4"/>
+                </a:solidFill>
+                <a:latin typeface="+mj-lt"/>
+                <a:ea typeface="+mj-ea"/>
+                <a:cs typeface="+mj-cs"/>
+              </a:rPr>
+              <a:t>	</a:t>
+            </a:r>
+          </a:p>
+          <a:p>
+            <a:r>
+              <a:rPr lang="en-US" altLang="zh-CN" sz="1600" spc="50" dirty="0">
+                <a:ln w="12700">
+                  <a:noFill/>
+                  <a:prstDash val="solid"/>
+                </a:ln>
+                <a:solidFill>
+                  <a:schemeClr val="accent4"/>
+                </a:solidFill>
+                <a:latin typeface="+mj-lt"/>
+                <a:ea typeface="+mj-ea"/>
+                <a:cs typeface="+mj-cs"/>
+              </a:rPr>
+              <a:t>	</a:t>
+            </a:r>
+            <a:r>
+              <a:rPr lang="zh-CN" altLang="en-US" sz="1600" spc="50" dirty="0" smtClean="0">
+                <a:ln w="12700">
+                  <a:noFill/>
+                  <a:prstDash val="solid"/>
+                </a:ln>
+                <a:solidFill>
+                  <a:schemeClr val="accent4"/>
+                </a:solidFill>
+                <a:latin typeface="+mj-lt"/>
+                <a:ea typeface="+mj-ea"/>
+                <a:cs typeface="+mj-cs"/>
+              </a:rPr>
+              <a:t>提供</a:t>
+            </a:r>
+            <a:r>
+              <a:rPr lang="zh-CN" altLang="en-US" sz="1600" spc="50" dirty="0" smtClean="0">
+                <a:ln w="12700">
+                  <a:noFill/>
+                  <a:prstDash val="solid"/>
+                </a:ln>
+                <a:solidFill>
+                  <a:schemeClr val="accent4"/>
+                </a:solidFill>
+                <a:latin typeface="+mj-lt"/>
+                <a:ea typeface="+mj-ea"/>
+                <a:cs typeface="+mj-cs"/>
+              </a:rPr>
+              <a:t>默认</a:t>
+            </a:r>
+            <a:r>
+              <a:rPr lang="zh-CN" altLang="en-US" sz="1600" spc="50" dirty="0" smtClean="0">
+                <a:ln w="12700">
+                  <a:noFill/>
+                  <a:prstDash val="solid"/>
+                </a:ln>
+                <a:solidFill>
+                  <a:schemeClr val="accent4"/>
+                </a:solidFill>
+                <a:latin typeface="+mj-lt"/>
+                <a:ea typeface="+mj-ea"/>
+                <a:cs typeface="+mj-cs"/>
+              </a:rPr>
+              <a:t>操作 </a:t>
+            </a:r>
+            <a:r>
+              <a:rPr lang="en-US" altLang="zh-CN" sz="1600" spc="50" dirty="0" smtClean="0">
+                <a:ln w="12700">
+                  <a:noFill/>
+                  <a:prstDash val="solid"/>
+                </a:ln>
+                <a:solidFill>
+                  <a:schemeClr val="accent4"/>
+                </a:solidFill>
+                <a:latin typeface="+mj-lt"/>
+                <a:ea typeface="+mj-ea"/>
+                <a:cs typeface="+mj-cs"/>
+              </a:rPr>
+              <a:t>/ </a:t>
+            </a:r>
+            <a:r>
+              <a:rPr lang="zh-CN" altLang="en-US" sz="1600" spc="50" dirty="0" smtClean="0">
+                <a:ln w="12700">
+                  <a:noFill/>
+                  <a:prstDash val="solid"/>
+                </a:ln>
+                <a:solidFill>
+                  <a:schemeClr val="accent4"/>
+                </a:solidFill>
+                <a:latin typeface="+mj-lt"/>
+                <a:ea typeface="+mj-ea"/>
+                <a:cs typeface="+mj-cs"/>
+              </a:rPr>
+              <a:t>标准操作</a:t>
+            </a:r>
+            <a:r>
+              <a:rPr lang="en-US" altLang="zh-CN" sz="1600" spc="50" dirty="0" smtClean="0">
+                <a:ln w="12700">
+                  <a:noFill/>
+                  <a:prstDash val="solid"/>
+                </a:ln>
+                <a:solidFill>
+                  <a:schemeClr val="accent4"/>
+                </a:solidFill>
+                <a:latin typeface="+mj-lt"/>
+                <a:ea typeface="+mj-ea"/>
+                <a:cs typeface="+mj-cs"/>
+              </a:rPr>
+              <a:t/>
+            </a:r>
+            <a:br>
+              <a:rPr lang="en-US" altLang="zh-CN" sz="1600" spc="50" dirty="0" smtClean="0">
+                <a:ln w="12700">
+                  <a:noFill/>
+                  <a:prstDash val="solid"/>
+                </a:ln>
+                <a:solidFill>
+                  <a:schemeClr val="accent4"/>
+                </a:solidFill>
+                <a:latin typeface="+mj-lt"/>
+                <a:ea typeface="+mj-ea"/>
+                <a:cs typeface="+mj-cs"/>
+              </a:rPr>
+            </a:br>
+            <a:endParaRPr lang="en-US" altLang="zh-CN" sz="1600" spc="50" dirty="0" smtClean="0">
+              <a:ln w="12700">
+                <a:noFill/>
+                <a:prstDash val="solid"/>
+              </a:ln>
+              <a:solidFill>
+                <a:schemeClr val="accent4"/>
+              </a:solidFill>
+              <a:latin typeface="+mj-lt"/>
+              <a:ea typeface="+mj-ea"/>
+              <a:cs typeface="+mj-cs"/>
+            </a:endParaRPr>
+          </a:p>
+          <a:p>
+            <a:r>
+              <a:rPr lang="en-US" altLang="zh-CN" sz="1600" spc="50" dirty="0">
+                <a:ln w="12700">
+                  <a:noFill/>
+                  <a:prstDash val="solid"/>
+                </a:ln>
+                <a:solidFill>
+                  <a:schemeClr val="accent4"/>
+                </a:solidFill>
+                <a:latin typeface="+mj-lt"/>
+                <a:ea typeface="+mj-ea"/>
+                <a:cs typeface="+mj-cs"/>
+              </a:rPr>
+              <a:t>	</a:t>
+            </a:r>
+            <a:r>
+              <a:rPr lang="zh-CN" altLang="en-US" sz="1600" spc="50" dirty="0" smtClean="0">
+                <a:ln w="12700">
+                  <a:noFill/>
+                  <a:prstDash val="solid"/>
+                </a:ln>
+                <a:solidFill>
+                  <a:schemeClr val="accent4"/>
+                </a:solidFill>
+                <a:latin typeface="+mj-lt"/>
+                <a:ea typeface="+mj-ea"/>
+                <a:cs typeface="+mj-cs"/>
+              </a:rPr>
+              <a:t>无方法体的</a:t>
+            </a:r>
+            <a:r>
+              <a:rPr lang="zh-CN" altLang="en-US" sz="1600" spc="50" dirty="0" smtClean="0">
+                <a:ln w="12700">
+                  <a:noFill/>
+                  <a:prstDash val="solid"/>
+                </a:ln>
+                <a:solidFill>
+                  <a:schemeClr val="accent4"/>
+                </a:solidFill>
+                <a:latin typeface="+mj-lt"/>
+                <a:ea typeface="+mj-ea"/>
+                <a:cs typeface="+mj-cs"/>
+              </a:rPr>
+              <a:t>空</a:t>
+            </a:r>
+            <a:r>
+              <a:rPr lang="zh-CN" altLang="en-US" sz="1600" spc="50" dirty="0" smtClean="0">
+                <a:ln w="12700">
+                  <a:noFill/>
+                  <a:prstDash val="solid"/>
+                </a:ln>
+                <a:solidFill>
+                  <a:schemeClr val="accent4"/>
+                </a:solidFill>
+                <a:latin typeface="+mj-lt"/>
+                <a:ea typeface="+mj-ea"/>
+                <a:cs typeface="+mj-cs"/>
+              </a:rPr>
+              <a:t>方法（忽略该操作</a:t>
+            </a:r>
+            <a:r>
+              <a:rPr lang="zh-CN" altLang="en-US" sz="1600" spc="50" dirty="0" smtClean="0">
+                <a:ln w="12700">
+                  <a:noFill/>
+                  <a:prstDash val="solid"/>
+                </a:ln>
+                <a:solidFill>
+                  <a:schemeClr val="accent4"/>
+                </a:solidFill>
+                <a:latin typeface="+mj-lt"/>
+                <a:ea typeface="+mj-ea"/>
+                <a:cs typeface="+mj-cs"/>
+              </a:rPr>
+              <a:t>）</a:t>
+            </a:r>
+            <a:endParaRPr lang="en-US" altLang="zh-CN" sz="1600" spc="50" dirty="0" smtClean="0">
+              <a:ln w="12700">
+                <a:noFill/>
+                <a:prstDash val="solid"/>
+              </a:ln>
+              <a:solidFill>
+                <a:schemeClr val="accent4"/>
+              </a:solidFill>
+              <a:latin typeface="+mj-lt"/>
+              <a:ea typeface="+mj-ea"/>
+              <a:cs typeface="+mj-cs"/>
+            </a:endParaRPr>
+          </a:p>
+          <a:p>
             <a:endParaRPr lang="en-US" altLang="zh-CN" sz="1600" b="1" spc="50" dirty="0" smtClean="0">
               <a:ln w="12700">
                 <a:noFill/>
@@ -9683,12 +10301,139 @@
               <a:solidFill>
                 <a:schemeClr val="accent4"/>
               </a:solidFill>
-              <a:latin typeface="+mj-lt"/>
-              <a:ea typeface="+mj-ea"/>
-              <a:cs typeface="+mj-cs"/>
-            </a:endParaRPr>
-          </a:p>
-          <a:p>
+            </a:endParaRPr>
+          </a:p>
+          <a:p>
+            <a:r>
+              <a:rPr lang="zh-CN" altLang="en-US" sz="1600" b="1" spc="50" dirty="0">
+                <a:ln w="12700">
+                  <a:noFill/>
+                  <a:prstDash val="solid"/>
+                </a:ln>
+                <a:solidFill>
+                  <a:schemeClr val="accent4"/>
+                </a:solidFill>
+              </a:rPr>
+              <a:t>      </a:t>
+            </a:r>
+            <a:r>
+              <a:rPr lang="en-US" altLang="zh-CN" sz="1600" b="1" spc="50" dirty="0">
+                <a:ln w="12700">
+                  <a:noFill/>
+                  <a:prstDash val="solid"/>
+                </a:ln>
+                <a:solidFill>
+                  <a:schemeClr val="accent4"/>
+                </a:solidFill>
+              </a:rPr>
+              <a:t>- </a:t>
+            </a:r>
+            <a:r>
+              <a:rPr lang="zh-CN" altLang="en-US" sz="1600" b="1" spc="50" dirty="0" smtClean="0">
+                <a:ln w="12700">
+                  <a:noFill/>
+                  <a:prstDash val="solid"/>
+                </a:ln>
+                <a:solidFill>
+                  <a:schemeClr val="accent4"/>
+                </a:solidFill>
+              </a:rPr>
+              <a:t>非标准的</a:t>
+            </a:r>
+            <a:r>
+              <a:rPr lang="en-US" altLang="zh-CN" sz="1600" b="1" spc="50" dirty="0" smtClean="0">
+                <a:ln w="12700">
+                  <a:noFill/>
+                  <a:prstDash val="solid"/>
+                </a:ln>
+                <a:solidFill>
+                  <a:schemeClr val="accent4"/>
+                </a:solidFill>
+              </a:rPr>
+              <a:t>Builder</a:t>
+            </a:r>
+            <a:r>
+              <a:rPr lang="zh-CN" altLang="en-US" sz="1600" b="1" spc="50" dirty="0" smtClean="0">
+                <a:ln w="12700">
+                  <a:noFill/>
+                  <a:prstDash val="solid"/>
+                </a:ln>
+                <a:solidFill>
+                  <a:schemeClr val="accent4"/>
+                </a:solidFill>
+              </a:rPr>
+              <a:t>模式</a:t>
+            </a:r>
+            <a:endParaRPr lang="en-US" altLang="zh-CN" sz="1600" b="1" spc="50" dirty="0" smtClean="0">
+              <a:ln w="12700">
+                <a:noFill/>
+                <a:prstDash val="solid"/>
+              </a:ln>
+              <a:solidFill>
+                <a:schemeClr val="accent4"/>
+              </a:solidFill>
+            </a:endParaRPr>
+          </a:p>
+          <a:p>
+            <a:r>
+              <a:rPr lang="en-US" altLang="zh-CN" sz="1600" b="1" spc="50" dirty="0">
+                <a:ln w="12700">
+                  <a:noFill/>
+                  <a:prstDash val="solid"/>
+                </a:ln>
+                <a:solidFill>
+                  <a:schemeClr val="accent4"/>
+                </a:solidFill>
+              </a:rPr>
+              <a:t>	</a:t>
+            </a:r>
+            <a:r>
+              <a:rPr lang="en-US" altLang="zh-CN" sz="1600" b="1" spc="50" dirty="0" smtClean="0">
+                <a:ln w="12700">
+                  <a:noFill/>
+                  <a:prstDash val="solid"/>
+                </a:ln>
+                <a:solidFill>
+                  <a:schemeClr val="accent4"/>
+                </a:solidFill>
+              </a:rPr>
+              <a:t/>
+            </a:r>
+            <a:br>
+              <a:rPr lang="en-US" altLang="zh-CN" sz="1600" b="1" spc="50" dirty="0" smtClean="0">
+                <a:ln w="12700">
+                  <a:noFill/>
+                  <a:prstDash val="solid"/>
+                </a:ln>
+                <a:solidFill>
+                  <a:schemeClr val="accent4"/>
+                </a:solidFill>
+              </a:rPr>
+            </a:br>
+            <a:r>
+              <a:rPr lang="en-US" altLang="zh-CN" sz="1600" b="1" spc="50" dirty="0" smtClean="0">
+                <a:ln w="12700">
+                  <a:noFill/>
+                  <a:prstDash val="solid"/>
+                </a:ln>
+                <a:solidFill>
+                  <a:schemeClr val="accent4"/>
+                </a:solidFill>
+              </a:rPr>
+              <a:t>	</a:t>
+            </a:r>
+            <a:r>
+              <a:rPr lang="zh-CN" altLang="en-US" sz="1600" spc="50" dirty="0" smtClean="0">
+                <a:ln w="12700">
+                  <a:noFill/>
+                  <a:prstDash val="solid"/>
+                </a:ln>
+                <a:solidFill>
+                  <a:schemeClr val="accent4"/>
+                </a:solidFill>
+              </a:rPr>
+              <a:t>有</a:t>
+            </a:r>
             <a:r>
               <a:rPr lang="en-US" altLang="zh-CN" sz="1600" spc="50" dirty="0" smtClean="0">
                 <a:ln w="12700">
@@ -9698,11 +10443,20 @@
                 <a:solidFill>
                   <a:schemeClr val="accent4"/>
                 </a:solidFill>
-                <a:latin typeface="+mj-lt"/>
-                <a:ea typeface="+mj-ea"/>
-                <a:cs typeface="+mj-cs"/>
-              </a:rPr>
-              <a:t>              </a:t>
+              </a:rPr>
+              <a:t>Builder</a:t>
+            </a:r>
+            <a:r>
+              <a:rPr lang="zh-CN" altLang="en-US" sz="1600" spc="50" dirty="0" smtClean="0">
+                <a:ln w="12700">
+                  <a:noFill/>
+                  <a:prstDash val="solid"/>
+                </a:ln>
+                <a:solidFill>
+                  <a:schemeClr val="accent4"/>
+                </a:solidFill>
+              </a:rPr>
+              <a:t>但没有独立的</a:t>
             </a:r>
             <a:r>
               <a:rPr lang="en-US" altLang="zh-CN" sz="1600" spc="50" dirty="0" smtClean="0">
@@ -9713,11 +10467,8 @@
                 <a:solidFill>
                   <a:schemeClr val="accent4"/>
                 </a:solidFill>
-                <a:latin typeface="+mj-lt"/>
-                <a:ea typeface="+mj-ea"/>
-                <a:cs typeface="+mj-cs"/>
-              </a:rPr>
-              <a:t>	Product</a:t>
+              </a:rPr>
+              <a:t>Director</a:t>
             </a:r>
             <a:r>
               <a:rPr lang="zh-CN" altLang="en-US" sz="1600" spc="50" dirty="0" smtClean="0">
@@ -9728,26 +10479,20 @@
                 <a:solidFill>
                   <a:schemeClr val="accent4"/>
                 </a:solidFill>
-                <a:latin typeface="+mj-lt"/>
-                <a:ea typeface="+mj-ea"/>
-                <a:cs typeface="+mj-cs"/>
-              </a:rPr>
-              <a:t>个体之间差异太大（场景更具</a:t>
-            </a:r>
-            <a:r>
-              <a:rPr lang="zh-CN" altLang="en-US" sz="1600" spc="50" dirty="0">
-                <a:ln w="12700">
-                  <a:noFill/>
-                  <a:prstDash val="solid"/>
-                </a:ln>
-                <a:solidFill>
-                  <a:schemeClr val="accent4"/>
-                </a:solidFill>
-                <a:latin typeface="+mj-lt"/>
-                <a:ea typeface="+mj-ea"/>
-                <a:cs typeface="+mj-cs"/>
-              </a:rPr>
-              <a:t>一般性），难于</a:t>
+              </a:rPr>
+              <a:t>（构建过程未分离到</a:t>
+            </a:r>
+            <a:r>
+              <a:rPr lang="en-US" altLang="zh-CN" sz="1600" spc="50" dirty="0" smtClean="0">
+                <a:ln w="12700">
+                  <a:noFill/>
+                  <a:prstDash val="solid"/>
+                </a:ln>
+                <a:solidFill>
+                  <a:schemeClr val="accent4"/>
+                </a:solidFill>
+              </a:rPr>
+              <a:t>Director</a:t>
             </a:r>
             <a:r>
               <a:rPr lang="zh-CN" altLang="en-US" sz="1600" spc="50" dirty="0" smtClean="0">
@@ -9758,11 +10503,8 @@
                 <a:solidFill>
                   <a:schemeClr val="accent4"/>
                 </a:solidFill>
-                <a:latin typeface="+mj-lt"/>
-                <a:ea typeface="+mj-ea"/>
-                <a:cs typeface="+mj-cs"/>
-              </a:rPr>
-              <a:t>抽象</a:t>
+              </a:rPr>
+              <a:t>）</a:t>
             </a:r>
             <a:endParaRPr lang="en-US" altLang="zh-CN" sz="1600" spc="50" dirty="0" smtClean="0">
               <a:ln w="12700">
@@ -9772,144 +10514,9 @@
               <a:solidFill>
                 <a:schemeClr val="accent4"/>
               </a:solidFill>
-              <a:latin typeface="+mj-lt"/>
-              <a:ea typeface="+mj-ea"/>
-              <a:cs typeface="+mj-cs"/>
-            </a:endParaRPr>
-          </a:p>
-          <a:p>
-            <a:endParaRPr lang="en-US" altLang="zh-CN" sz="1600" spc="50" dirty="0" smtClean="0">
-              <a:ln w="12700">
-                <a:noFill/>
-                <a:prstDash val="solid"/>
-              </a:ln>
-              <a:solidFill>
-                <a:schemeClr val="accent4"/>
-              </a:solidFill>
-              <a:latin typeface="+mj-lt"/>
-              <a:ea typeface="+mj-ea"/>
-              <a:cs typeface="+mj-cs"/>
-            </a:endParaRPr>
-          </a:p>
-          <a:p>
-            <a:r>
-              <a:rPr lang="en-US" altLang="zh-CN" sz="1600" spc="50" dirty="0">
-                <a:ln w="12700">
-                  <a:noFill/>
-                  <a:prstDash val="solid"/>
-                </a:ln>
-                <a:solidFill>
-                  <a:schemeClr val="accent4"/>
-                </a:solidFill>
-                <a:latin typeface="+mj-lt"/>
-                <a:ea typeface="+mj-ea"/>
-                <a:cs typeface="+mj-cs"/>
-              </a:rPr>
-              <a:t>	</a:t>
-            </a:r>
-            <a:r>
-              <a:rPr lang="zh-CN" altLang="en-US" sz="1600" spc="50" dirty="0" smtClean="0">
-                <a:ln w="12700">
-                  <a:noFill/>
-                  <a:prstDash val="solid"/>
-                </a:ln>
-                <a:solidFill>
-                  <a:schemeClr val="accent4"/>
-                </a:solidFill>
-                <a:latin typeface="+mj-lt"/>
-                <a:ea typeface="+mj-ea"/>
-                <a:cs typeface="+mj-cs"/>
-              </a:rPr>
-              <a:t>需要明确知晓具体</a:t>
-            </a:r>
-            <a:r>
-              <a:rPr lang="en-US" altLang="zh-CN" sz="1600" spc="50" dirty="0" smtClean="0">
-                <a:ln w="12700">
-                  <a:noFill/>
-                  <a:prstDash val="solid"/>
-                </a:ln>
-                <a:solidFill>
-                  <a:schemeClr val="accent4"/>
-                </a:solidFill>
-                <a:latin typeface="+mj-lt"/>
-                <a:ea typeface="+mj-ea"/>
-                <a:cs typeface="+mj-cs"/>
-              </a:rPr>
-              <a:t>Product</a:t>
-            </a:r>
-            <a:r>
-              <a:rPr lang="zh-CN" altLang="en-US" sz="1600" spc="50" dirty="0" smtClean="0">
-                <a:ln w="12700">
-                  <a:noFill/>
-                  <a:prstDash val="solid"/>
-                </a:ln>
-                <a:solidFill>
-                  <a:schemeClr val="accent4"/>
-                </a:solidFill>
-                <a:latin typeface="+mj-lt"/>
-                <a:ea typeface="+mj-ea"/>
-                <a:cs typeface="+mj-cs"/>
-              </a:rPr>
-              <a:t>个体，针对差异点进行不同操作</a:t>
-            </a:r>
-            <a:endParaRPr lang="en-US" altLang="zh-CN" sz="1600" spc="50" dirty="0" smtClean="0">
-              <a:ln w="12700">
-                <a:noFill/>
-                <a:prstDash val="solid"/>
-              </a:ln>
-              <a:solidFill>
-                <a:schemeClr val="accent4"/>
-              </a:solidFill>
-              <a:latin typeface="+mj-lt"/>
-              <a:ea typeface="+mj-ea"/>
-              <a:cs typeface="+mj-cs"/>
-            </a:endParaRPr>
-          </a:p>
-          <a:p>
-            <a:endParaRPr lang="en-US" altLang="zh-CN" sz="1600" spc="50" dirty="0" smtClean="0">
-              <a:ln w="12700">
-                <a:noFill/>
-                <a:prstDash val="solid"/>
-              </a:ln>
-              <a:solidFill>
-                <a:schemeClr val="accent4"/>
-              </a:solidFill>
-              <a:latin typeface="+mj-lt"/>
-              <a:ea typeface="+mj-ea"/>
-              <a:cs typeface="+mj-cs"/>
-            </a:endParaRPr>
-          </a:p>
-          <a:p>
-            <a:r>
-              <a:rPr lang="en-US" altLang="zh-CN" sz="1600" spc="50" dirty="0">
-                <a:ln w="12700">
-                  <a:noFill/>
-                  <a:prstDash val="solid"/>
-                </a:ln>
-                <a:solidFill>
-                  <a:schemeClr val="accent4"/>
-                </a:solidFill>
-                <a:latin typeface="+mj-lt"/>
-                <a:ea typeface="+mj-ea"/>
-                <a:cs typeface="+mj-cs"/>
-              </a:rPr>
-              <a:t>	</a:t>
-            </a:r>
-            <a:r>
-              <a:rPr lang="zh-CN" altLang="en-US" sz="1600" spc="50" dirty="0" smtClean="0">
-                <a:ln w="12700">
-                  <a:noFill/>
-                  <a:prstDash val="solid"/>
-                </a:ln>
-                <a:solidFill>
-                  <a:schemeClr val="accent4"/>
-                </a:solidFill>
-                <a:latin typeface="+mj-lt"/>
-                <a:ea typeface="+mj-ea"/>
-                <a:cs typeface="+mj-cs"/>
-              </a:rPr>
-              <a:t>对其抽象代价不菲，引入不必要的混乱，亦显僵硬死板</a:t>
-            </a:r>
+            </a:endParaRPr>
+          </a:p>
+          <a:p>
             <a:endParaRPr lang="en-US" altLang="zh-CN" sz="1600" spc="50" dirty="0">
               <a:ln w="12700">
                 <a:noFill/>
@@ -9918,87 +10525,118 @@
               <a:solidFill>
                 <a:schemeClr val="accent4"/>
               </a:solidFill>
-              <a:latin typeface="+mj-lt"/>
-              <a:ea typeface="+mj-ea"/>
-              <a:cs typeface="+mj-cs"/>
-            </a:endParaRPr>
-          </a:p>
-          <a:p>
-            <a:endParaRPr lang="en-US" altLang="zh-CN" sz="1600" b="1" spc="50" dirty="0">
-              <a:ln w="12700">
-                <a:noFill/>
-                <a:prstDash val="solid"/>
-              </a:ln>
-              <a:solidFill>
-                <a:schemeClr val="accent4"/>
-              </a:solidFill>
-              <a:latin typeface="+mj-lt"/>
-              <a:ea typeface="+mj-ea"/>
-              <a:cs typeface="+mj-cs"/>
-            </a:endParaRPr>
-          </a:p>
-          <a:p>
-            <a:r>
-              <a:rPr lang="zh-CN" altLang="en-US" sz="1600" b="1" spc="50" dirty="0" smtClean="0">
-                <a:ln w="12700">
-                  <a:noFill/>
-                  <a:prstDash val="solid"/>
-                </a:ln>
-                <a:solidFill>
-                  <a:schemeClr val="accent4"/>
-                </a:solidFill>
-                <a:latin typeface="+mj-lt"/>
-                <a:ea typeface="+mj-ea"/>
-                <a:cs typeface="+mj-cs"/>
-              </a:rPr>
-              <a:t>      </a:t>
-            </a:r>
-            <a:r>
-              <a:rPr lang="en-US" altLang="zh-CN" sz="1600" b="1" spc="50" dirty="0" smtClean="0">
-                <a:ln w="12700">
-                  <a:noFill/>
-                  <a:prstDash val="solid"/>
-                </a:ln>
-                <a:solidFill>
-                  <a:schemeClr val="accent4"/>
-                </a:solidFill>
-                <a:latin typeface="+mj-lt"/>
-                <a:ea typeface="+mj-ea"/>
-                <a:cs typeface="+mj-cs"/>
-              </a:rPr>
-              <a:t>- </a:t>
-            </a:r>
-            <a:r>
-              <a:rPr lang="en-US" altLang="zh-CN" sz="1600" b="1" spc="50" dirty="0" smtClean="0">
-                <a:ln w="12700">
-                  <a:noFill/>
-                  <a:prstDash val="solid"/>
-                </a:ln>
-                <a:solidFill>
-                  <a:schemeClr val="accent4"/>
-                </a:solidFill>
-                <a:latin typeface="+mj-lt"/>
-                <a:ea typeface="+mj-ea"/>
-                <a:cs typeface="+mj-cs"/>
+            </a:endParaRPr>
+          </a:p>
+          <a:p>
+            <a:r>
+              <a:rPr lang="en-US" altLang="zh-CN" sz="1600" spc="50" dirty="0" smtClean="0">
+                <a:ln w="12700">
+                  <a:noFill/>
+                  <a:prstDash val="solid"/>
+                </a:ln>
+                <a:solidFill>
+                  <a:schemeClr val="accent4"/>
+                </a:solidFill>
+              </a:rPr>
+              <a:t>	Product</a:t>
+            </a:r>
+            <a:r>
+              <a:rPr lang="zh-CN" altLang="en-US" sz="1600" spc="50" dirty="0" smtClean="0">
+                <a:ln w="12700">
+                  <a:noFill/>
+                  <a:prstDash val="solid"/>
+                </a:ln>
+                <a:solidFill>
+                  <a:schemeClr val="accent4"/>
+                </a:solidFill>
+              </a:rPr>
+              <a:t>作为</a:t>
+            </a:r>
+            <a:r>
+              <a:rPr lang="en-US" altLang="zh-CN" sz="1600" spc="50" dirty="0" smtClean="0">
+                <a:ln w="12700">
+                  <a:noFill/>
+                  <a:prstDash val="solid"/>
+                </a:ln>
+                <a:solidFill>
+                  <a:schemeClr val="accent4"/>
+                </a:solidFill>
+              </a:rPr>
+              <a:t>Director</a:t>
+            </a:r>
+            <a:r>
+              <a:rPr lang="zh-CN" altLang="en-US" sz="1600" spc="50" dirty="0" smtClean="0">
+                <a:ln w="12700">
+                  <a:noFill/>
+                  <a:prstDash val="solid"/>
+                </a:ln>
+                <a:solidFill>
+                  <a:schemeClr val="accent4"/>
+                </a:solidFill>
+              </a:rPr>
+              <a:t>（</a:t>
+            </a:r>
+            <a:r>
+              <a:rPr lang="en-US" altLang="zh-CN" sz="1600" spc="50" dirty="0" smtClean="0">
+                <a:ln w="12700">
+                  <a:noFill/>
+                  <a:prstDash val="solid"/>
+                </a:ln>
+                <a:solidFill>
+                  <a:schemeClr val="accent4"/>
+                </a:solidFill>
+              </a:rPr>
+              <a:t>Product</a:t>
+            </a:r>
+            <a:r>
+              <a:rPr lang="zh-CN" altLang="en-US" sz="1600" spc="50" dirty="0" smtClean="0">
+                <a:ln w="12700">
+                  <a:noFill/>
+                  <a:prstDash val="solid"/>
+                </a:ln>
+                <a:solidFill>
+                  <a:schemeClr val="accent4"/>
+                </a:solidFill>
+              </a:rPr>
+              <a:t>自己控制构建过程，自己构建自己，</a:t>
+            </a:r>
+            <a:r>
+              <a:rPr lang="zh-CN" altLang="en-US" sz="1600" spc="50" dirty="0">
+                <a:ln w="12700">
+                  <a:noFill/>
+                  <a:prstDash val="solid"/>
+                </a:ln>
+                <a:solidFill>
+                  <a:schemeClr val="accent4"/>
+                </a:solidFill>
+              </a:rPr>
+              <a:t>依赖</a:t>
+            </a:r>
+            <a:r>
+              <a:rPr lang="en-US" altLang="zh-CN" sz="1600" spc="50" dirty="0" smtClean="0">
+                <a:ln w="12700">
+                  <a:noFill/>
+                  <a:prstDash val="solid"/>
+                </a:ln>
+                <a:solidFill>
+                  <a:schemeClr val="accent4"/>
+                </a:solidFill>
               </a:rPr>
               <a:t>Builder</a:t>
             </a:r>
             <a:r>
-              <a:rPr lang="zh-CN" altLang="en-US" sz="1600" b="1" spc="50" dirty="0" smtClean="0">
-                <a:ln w="12700">
-                  <a:noFill/>
-                  <a:prstDash val="solid"/>
-                </a:ln>
-                <a:solidFill>
-                  <a:schemeClr val="accent4"/>
-                </a:solidFill>
-                <a:latin typeface="+mj-lt"/>
-                <a:ea typeface="+mj-ea"/>
-                <a:cs typeface="+mj-cs"/>
-              </a:rPr>
-              <a:t>可提供非虚方法，提供默认操作，或者定义为空方法（忽略该操作）</a:t>
-            </a:r>
-            <a:endParaRPr lang="en-US" altLang="zh-CN" sz="1600" b="1" spc="50" dirty="0" smtClean="0">
+              <a:rPr lang="zh-CN" altLang="en-US" sz="1600" spc="50" dirty="0" smtClean="0">
+                <a:ln w="12700">
+                  <a:noFill/>
+                  <a:prstDash val="solid"/>
+                </a:ln>
+                <a:solidFill>
+                  <a:schemeClr val="accent4"/>
+                </a:solidFill>
+              </a:rPr>
+              <a:t>）</a:t>
+            </a:r>
+            <a:endParaRPr lang="en-US" altLang="zh-CN" sz="1600" spc="50" dirty="0" smtClean="0">
               <a:ln w="12700">
                 <a:noFill/>
                 <a:prstDash val="solid"/>
@@ -10096,137 +10734,6 @@
           <a:chExt cx="0" cy="0"/>
         </a:xfrm>
       </p:grpSpPr>
-      <p:pic>
-        <p:nvPicPr>
-          <p:cNvPr id="7170" name="Picture 2"/>
-          <p:cNvPicPr>
-            <a:picLocks noChangeAspect="1" noChangeArrowheads="1"/>
-          </p:cNvPicPr>
-          <p:nvPr/>
-        </p:nvPicPr>
-        <p:blipFill>
-          <a:blip r:embed="rId2">
-            <a:extLst>
-              <a:ext uri="{28A0092B-C50C-407E-A947-70E740481C1C}">
-                <a14:useLocalDpi xmlns:a14="http://schemas.microsoft.com/office/drawing/2010/main" val="0"/>
-              </a:ext>
-            </a:extLst>
-          </a:blip>
-          <a:srcRect/>
-          <a:stretch>
-            <a:fillRect/>
-          </a:stretch>
-        </p:blipFill>
-        <p:spPr bwMode="auto">
-          <a:xfrm>
-            <a:off x="1043608" y="2305050"/>
-            <a:ext cx="6973245" cy="2852142"/>
-          </a:xfrm>
-          <a:prstGeom prst="rect">
-            <a:avLst/>
-          </a:prstGeom>
-          <a:noFill/>
-          <a:ln>
-            <a:noFill/>
-          </a:ln>
-          <a:effectLst/>
-          <a:extLst>
-            <a:ext uri="{909E8E84-426E-40DD-AFC4-6F175D3DCCD1}">
-              <a14:hiddenFill xmlns:a14="http://schemas.microsoft.com/office/drawing/2010/main">
-                <a:solidFill>
-                  <a:schemeClr val="accent1"/>
-                </a:solidFill>
-              </a14:hiddenFill>
-            </a:ext>
-            <a:ext uri="{91240B29-F687-4F45-9708-019B960494DF}">
-              <a14:hiddenLine xmlns:a14="http://schemas.microsoft.com/office/drawing/2010/main" w="9525">
-                <a:solidFill>
-                  <a:schemeClr val="tx1"/>
-                </a:solidFill>
-                <a:miter lim="800000"/>
-                <a:headEnd/>
-                <a:tailEnd/>
-              </a14:hiddenLine>
-            </a:ext>
-            <a:ext uri="{AF507438-7753-43E0-B8FC-AC1667EBCBE1}">
-              <a14:hiddenEffects xmlns:a14="http://schemas.microsoft.com/office/drawing/2010/main">
-                <a:effectLst>
-                  <a:outerShdw dist="35921" dir="2700000" algn="ctr" rotWithShape="0">
-                    <a:schemeClr val="bg2"/>
-                  </a:outerShdw>
-                </a:effectLst>
-              </a14:hiddenEffects>
-            </a:ext>
-          </a:extLst>
-        </p:spPr>
-      </p:pic>
-      <p:sp>
-        <p:nvSpPr>
-          <p:cNvPr id="8" name="TextBox 7"/>
-          <p:cNvSpPr txBox="1"/>
-          <p:nvPr/>
-        </p:nvSpPr>
-        <p:spPr>
-          <a:xfrm>
-            <a:off x="251520" y="1475492"/>
-            <a:ext cx="1656184" cy="353943"/>
-          </a:xfrm>
-          <a:prstGeom prst="rect">
-            <a:avLst/>
-          </a:prstGeom>
-          <a:noFill/>
-        </p:spPr>
-        <p:txBody>
-          <a:bodyPr wrap="square" rtlCol="0">
-            <a:spAutoFit/>
-          </a:bodyPr>
-          <a:lstStyle/>
-          <a:p>
-            <a:r>
-              <a:rPr lang="en-US" altLang="zh-CN" sz="1700" b="1" spc="50" dirty="0">
-                <a:ln w="12700">
-                  <a:noFill/>
-                  <a:prstDash val="solid"/>
-                </a:ln>
-                <a:solidFill>
-                  <a:schemeClr val="accent4"/>
-                </a:solidFill>
-                <a:latin typeface="+mj-lt"/>
-                <a:ea typeface="+mj-ea"/>
-                <a:cs typeface="+mj-cs"/>
-              </a:rPr>
-              <a:t>GOF</a:t>
-            </a:r>
-            <a:r>
-              <a:rPr lang="en-US" altLang="zh-CN" sz="1700" b="1" spc="50" dirty="0">
-                <a:ln w="12700">
-                  <a:noFill/>
-                  <a:prstDash val="solid"/>
-                </a:ln>
-                <a:solidFill>
-                  <a:schemeClr val="accent4"/>
-                </a:solidFill>
-                <a:latin typeface="+mj-lt"/>
-                <a:ea typeface="+mj-ea"/>
-                <a:cs typeface="+mj-cs"/>
-              </a:rPr>
-              <a:t> Example</a:t>
-            </a:r>
-            <a:endParaRPr lang="en-US" altLang="en-US" sz="1700" b="1" spc="50" dirty="0">
-              <a:ln w="12700">
-                <a:noFill/>
-                <a:prstDash val="solid"/>
-              </a:ln>
-              <a:solidFill>
-                <a:schemeClr val="accent4"/>
-              </a:solidFill>
-              <a:latin typeface="+mj-lt"/>
-              <a:ea typeface="+mj-ea"/>
-              <a:cs typeface="+mj-cs"/>
-            </a:endParaRPr>
-          </a:p>
-        </p:txBody>
-      </p:sp>
       <p:sp>
         <p:nvSpPr>
           <p:cNvPr id="9" name="Rectangle 2"/>
@@ -10266,13 +10773,416 @@
           </a:lstStyle>
           <a:p>
             <a:r>
-              <a:rPr lang="en-US" altLang="zh-CN" smtClean="0"/>
-              <a:t>Builder</a:t>
+              <a:rPr lang="en-US" altLang="zh-CN" dirty="0" smtClean="0"/>
+              <a:t>Example</a:t>
             </a:r>
             <a:endParaRPr lang="zh-CN" altLang="en-US" dirty="0"/>
           </a:p>
         </p:txBody>
       </p:sp>
+      <p:sp>
+        <p:nvSpPr>
+          <p:cNvPr id="5" name="矩形 4"/>
+          <p:cNvSpPr/>
+          <p:nvPr/>
+        </p:nvSpPr>
+        <p:spPr>
+          <a:xfrm>
+            <a:off x="827584" y="1340768"/>
+            <a:ext cx="7632848" cy="4955203"/>
+          </a:xfrm>
+          <a:prstGeom prst="rect">
+            <a:avLst/>
+          </a:prstGeom>
+        </p:spPr>
+        <p:txBody>
+          <a:bodyPr wrap="square">
+            <a:spAutoFit/>
+          </a:bodyPr>
+          <a:lstStyle/>
+          <a:p>
+            <a:r>
+              <a:rPr lang="en-US" altLang="zh-CN" b="1" dirty="0" smtClean="0">
+                <a:solidFill>
+                  <a:schemeClr val="accent4"/>
+                </a:solidFill>
+              </a:rPr>
+              <a:t>RTF Reader</a:t>
+            </a:r>
+            <a:r>
+              <a:rPr lang="zh-CN" altLang="en-US" b="1" dirty="0" smtClean="0">
+                <a:solidFill>
+                  <a:schemeClr val="accent4"/>
+                </a:solidFill>
+              </a:rPr>
+              <a:t>（富文本阅读器）</a:t>
+            </a:r>
+            <a:endParaRPr lang="en-US" altLang="zh-CN" b="1" dirty="0" smtClean="0">
+              <a:solidFill>
+                <a:schemeClr val="accent4"/>
+              </a:solidFill>
+            </a:endParaRPr>
+          </a:p>
+          <a:p>
+            <a:endParaRPr lang="en-US" altLang="zh-CN" sz="1400" b="1" dirty="0">
+              <a:solidFill>
+                <a:schemeClr val="accent4"/>
+              </a:solidFill>
+            </a:endParaRPr>
+          </a:p>
+          <a:p>
+            <a:endParaRPr lang="en-US" altLang="zh-CN" sz="1400" b="1" dirty="0" smtClean="0">
+              <a:solidFill>
+                <a:schemeClr val="accent4"/>
+              </a:solidFill>
+            </a:endParaRPr>
+          </a:p>
+          <a:p>
+            <a:endParaRPr lang="en-US" altLang="zh-CN" sz="1400" b="1" dirty="0">
+              <a:solidFill>
+                <a:schemeClr val="accent4"/>
+              </a:solidFill>
+            </a:endParaRPr>
+          </a:p>
+          <a:p>
+            <a:r>
+              <a:rPr lang="en-US" altLang="zh-CN" sz="1400" b="1" dirty="0" smtClean="0">
+                <a:solidFill>
+                  <a:schemeClr val="accent4"/>
+                </a:solidFill>
+              </a:rPr>
+              <a:t/>
+            </a:r>
+            <a:br>
+              <a:rPr lang="en-US" altLang="zh-CN" sz="1400" b="1" dirty="0" smtClean="0">
+                <a:solidFill>
+                  <a:schemeClr val="accent4"/>
+                </a:solidFill>
+              </a:rPr>
+            </a:br>
+            <a:endParaRPr lang="en-US" altLang="zh-CN" sz="1400" b="1" dirty="0" smtClean="0">
+              <a:solidFill>
+                <a:schemeClr val="accent4"/>
+              </a:solidFill>
+            </a:endParaRPr>
+          </a:p>
+          <a:p>
+            <a:endParaRPr lang="en-US" altLang="zh-CN" sz="1400" dirty="0" smtClean="0">
+              <a:solidFill>
+                <a:schemeClr val="accent4"/>
+              </a:solidFill>
+            </a:endParaRPr>
+          </a:p>
+          <a:p>
+            <a:endParaRPr lang="en-US" altLang="zh-CN" sz="1400" dirty="0">
+              <a:solidFill>
+                <a:schemeClr val="accent4"/>
+              </a:solidFill>
+            </a:endParaRPr>
+          </a:p>
+          <a:p>
+            <a:endParaRPr lang="en-US" altLang="zh-CN" sz="1400" dirty="0">
+              <a:solidFill>
+                <a:schemeClr val="accent4"/>
+              </a:solidFill>
+            </a:endParaRPr>
+          </a:p>
+          <a:p>
+            <a:endParaRPr lang="en-US" altLang="zh-CN" sz="1400" b="1" dirty="0" smtClean="0">
+              <a:solidFill>
+                <a:schemeClr val="accent4"/>
+              </a:solidFill>
+            </a:endParaRPr>
+          </a:p>
+          <a:p>
+            <a:endParaRPr lang="en-US" altLang="zh-CN" sz="1400" b="1" dirty="0">
+              <a:solidFill>
+                <a:schemeClr val="accent4"/>
+              </a:solidFill>
+            </a:endParaRPr>
+          </a:p>
+          <a:p>
+            <a:endParaRPr lang="en-US" altLang="zh-CN" sz="1400" b="1" dirty="0" smtClean="0">
+              <a:solidFill>
+                <a:schemeClr val="accent4"/>
+              </a:solidFill>
+            </a:endParaRPr>
+          </a:p>
+          <a:p>
+            <a:endParaRPr lang="en-US" altLang="zh-CN" sz="1400" b="1" dirty="0">
+              <a:solidFill>
+                <a:schemeClr val="accent4"/>
+              </a:solidFill>
+            </a:endParaRPr>
+          </a:p>
+          <a:p>
+            <a:r>
+              <a:rPr lang="en-US" altLang="zh-CN" sz="1400" dirty="0">
+                <a:solidFill>
+                  <a:schemeClr val="accent4"/>
+                </a:solidFill>
+              </a:rPr>
+              <a:t>	     - Director       </a:t>
+            </a:r>
+            <a:r>
+              <a:rPr lang="en-US" altLang="zh-CN" sz="1400" dirty="0" smtClean="0">
+                <a:solidFill>
+                  <a:schemeClr val="accent4"/>
+                </a:solidFill>
+              </a:rPr>
+              <a:t>RTFReader</a:t>
+            </a:r>
+            <a:endParaRPr lang="en-US" altLang="zh-CN" sz="1400" dirty="0">
+              <a:solidFill>
+                <a:schemeClr val="accent4"/>
+              </a:solidFill>
+            </a:endParaRPr>
+          </a:p>
+          <a:p>
+            <a:r>
+              <a:rPr lang="en-US" altLang="zh-CN" sz="1400" dirty="0">
+                <a:solidFill>
+                  <a:schemeClr val="accent4"/>
+                </a:solidFill>
+              </a:rPr>
+              <a:t>	     - Builder         </a:t>
+            </a:r>
+            <a:r>
+              <a:rPr lang="en-US" altLang="zh-CN" sz="1400" dirty="0" smtClean="0">
+                <a:solidFill>
+                  <a:schemeClr val="accent4"/>
+                </a:solidFill>
+              </a:rPr>
+              <a:t>TextConverter</a:t>
+            </a:r>
+            <a:endParaRPr lang="en-US" altLang="zh-CN" sz="1400" dirty="0">
+              <a:solidFill>
+                <a:schemeClr val="accent4"/>
+              </a:solidFill>
+            </a:endParaRPr>
+          </a:p>
+          <a:p>
+            <a:r>
+              <a:rPr lang="en-US" altLang="zh-CN" sz="1400" dirty="0">
+                <a:solidFill>
+                  <a:schemeClr val="accent4"/>
+                </a:solidFill>
+              </a:rPr>
+              <a:t>	     - Product        </a:t>
+            </a:r>
+            <a:r>
+              <a:rPr lang="en-US" altLang="zh-CN" sz="1400" dirty="0" smtClean="0">
+                <a:solidFill>
+                  <a:schemeClr val="accent4"/>
+                </a:solidFill>
+              </a:rPr>
+              <a:t>ASCIIText, TeXText, TextWidget</a:t>
+            </a:r>
+            <a:endParaRPr lang="en-US" altLang="zh-CN" sz="1400" dirty="0">
+              <a:solidFill>
+                <a:schemeClr val="accent4"/>
+              </a:solidFill>
+            </a:endParaRPr>
+          </a:p>
+          <a:p>
+            <a:endParaRPr lang="en-US" altLang="zh-CN" sz="1400" b="1" dirty="0" smtClean="0">
+              <a:solidFill>
+                <a:schemeClr val="accent4"/>
+              </a:solidFill>
+            </a:endParaRPr>
+          </a:p>
+          <a:p>
+            <a:r>
+              <a:rPr lang="en-US" altLang="zh-CN" b="1" dirty="0" smtClean="0">
+                <a:solidFill>
+                  <a:schemeClr val="accent4"/>
+                </a:solidFill>
+              </a:rPr>
+              <a:t>Compiler</a:t>
+            </a:r>
+            <a:r>
+              <a:rPr lang="zh-CN" altLang="en-US" b="1" dirty="0" smtClean="0">
+                <a:solidFill>
+                  <a:schemeClr val="accent4"/>
+                </a:solidFill>
+              </a:rPr>
+              <a:t>（编译器）</a:t>
+            </a:r>
+            <a:r>
+              <a:rPr lang="en-US" altLang="zh-CN" sz="1400" b="1" dirty="0" smtClean="0">
+                <a:solidFill>
+                  <a:schemeClr val="accent4"/>
+                </a:solidFill>
+              </a:rPr>
+              <a:t/>
+            </a:r>
+            <a:br>
+              <a:rPr lang="en-US" altLang="zh-CN" sz="1400" b="1" dirty="0" smtClean="0">
+                <a:solidFill>
+                  <a:schemeClr val="accent4"/>
+                </a:solidFill>
+              </a:rPr>
+            </a:br>
+            <a:endParaRPr lang="en-US" altLang="zh-CN" sz="1400" b="1" dirty="0">
+              <a:solidFill>
+                <a:schemeClr val="accent4"/>
+              </a:solidFill>
+            </a:endParaRPr>
+          </a:p>
+          <a:p>
+            <a:r>
+              <a:rPr lang="en-US" altLang="zh-CN" sz="1400" dirty="0">
+                <a:solidFill>
+                  <a:schemeClr val="accent4"/>
+                </a:solidFill>
+              </a:rPr>
+              <a:t>	     - </a:t>
+            </a:r>
+            <a:r>
+              <a:rPr lang="en-US" altLang="zh-CN" sz="1400" dirty="0" smtClean="0">
+                <a:solidFill>
+                  <a:schemeClr val="accent4"/>
+                </a:solidFill>
+              </a:rPr>
+              <a:t>Director       Parser </a:t>
+            </a:r>
+            <a:r>
+              <a:rPr lang="zh-CN" altLang="en-US" sz="1400" dirty="0" smtClean="0">
+                <a:solidFill>
+                  <a:schemeClr val="accent4"/>
+                </a:solidFill>
+              </a:rPr>
+              <a:t>语法分析器  </a:t>
+            </a:r>
+            <a:r>
+              <a:rPr lang="en-US" altLang="zh-CN" sz="1400" dirty="0" smtClean="0">
+                <a:solidFill>
+                  <a:schemeClr val="accent4"/>
+                </a:solidFill>
+              </a:rPr>
+              <a:t>(switch … case …)</a:t>
+            </a:r>
+          </a:p>
+          <a:p>
+            <a:r>
+              <a:rPr lang="en-US" altLang="zh-CN" sz="1400" dirty="0">
+                <a:solidFill>
+                  <a:schemeClr val="accent4"/>
+                </a:solidFill>
+              </a:rPr>
+              <a:t>	</a:t>
+            </a:r>
+            <a:r>
+              <a:rPr lang="en-US" altLang="zh-CN" sz="1400" dirty="0" smtClean="0">
+                <a:solidFill>
+                  <a:schemeClr val="accent4"/>
+                </a:solidFill>
+              </a:rPr>
+              <a:t>     - Builder         ProgramNodeBulder </a:t>
+            </a:r>
+            <a:r>
+              <a:rPr lang="zh-CN" altLang="en-US" sz="1400" dirty="0" smtClean="0">
+                <a:solidFill>
+                  <a:schemeClr val="accent4"/>
+                </a:solidFill>
+              </a:rPr>
+              <a:t>语法生成器</a:t>
+            </a:r>
+            <a:endParaRPr lang="en-US" altLang="zh-CN" sz="1400" dirty="0" smtClean="0">
+              <a:solidFill>
+                <a:schemeClr val="accent4"/>
+              </a:solidFill>
+            </a:endParaRPr>
+          </a:p>
+          <a:p>
+            <a:r>
+              <a:rPr lang="en-US" altLang="zh-CN" sz="1400" dirty="0" smtClean="0">
+                <a:solidFill>
+                  <a:schemeClr val="accent4"/>
+                </a:solidFill>
+              </a:rPr>
+              <a:t>	     - Product        SyntaxTree </a:t>
+            </a:r>
+            <a:r>
+              <a:rPr lang="zh-CN" altLang="en-US" sz="1400" dirty="0" smtClean="0">
+                <a:solidFill>
+                  <a:schemeClr val="accent4"/>
+                </a:solidFill>
+              </a:rPr>
+              <a:t>语法树</a:t>
+            </a:r>
+            <a:endParaRPr lang="en-US" altLang="zh-CN" sz="1400" dirty="0" smtClean="0">
+              <a:solidFill>
+                <a:schemeClr val="accent4"/>
+              </a:solidFill>
+            </a:endParaRPr>
+          </a:p>
+        </p:txBody>
+      </p:sp>
+      <p:pic>
+        <p:nvPicPr>
+          <p:cNvPr id="7170" name="Picture 2"/>
+          <p:cNvPicPr>
+            <a:picLocks noChangeAspect="1" noChangeArrowheads="1"/>
+          </p:cNvPicPr>
+          <p:nvPr/>
+        </p:nvPicPr>
+        <p:blipFill>
+          <a:blip r:embed="rId2">
+            <a:extLst>
+              <a:ext uri="{28A0092B-C50C-407E-A947-70E740481C1C}">
+                <a14:useLocalDpi xmlns:a14="http://schemas.microsoft.com/office/drawing/2010/main" val="0"/>
+              </a:ext>
+            </a:extLst>
+          </a:blip>
+          <a:srcRect/>
+          <a:stretch>
+            <a:fillRect/>
+          </a:stretch>
+        </p:blipFill>
+        <p:spPr bwMode="auto">
+          <a:xfrm>
+            <a:off x="1979712" y="1844824"/>
+            <a:ext cx="5447712" cy="2228180"/>
+          </a:xfrm>
+          <a:prstGeom prst="rect">
+            <a:avLst/>
+          </a:prstGeom>
+          <a:noFill/>
+          <a:ln>
+            <a:noFill/>
+          </a:ln>
+          <a:effectLst/>
+          <a:extLst>
+            <a:ext uri="{909E8E84-426E-40DD-AFC4-6F175D3DCCD1}">
+              <a14:hiddenFill xmlns:a14="http://schemas.microsoft.com/office/drawing/2010/main">
+                <a:solidFill>
+                  <a:schemeClr val="accent1"/>
+                </a:solidFill>
+              </a14:hiddenFill>
+            </a:ext>
+            <a:ext uri="{91240B29-F687-4F45-9708-019B960494DF}">
+              <a14:hiddenLine xmlns:a14="http://schemas.microsoft.com/office/drawing/2010/main" w="9525">
+                <a:solidFill>
+                  <a:schemeClr val="tx1"/>
+                </a:solidFill>
+                <a:miter lim="800000"/>
+                <a:headEnd/>
+                <a:tailEnd/>
+              </a14:hiddenLine>
+            </a:ext>
+            <a:ext uri="{AF507438-7753-43E0-B8FC-AC1667EBCBE1}">
+              <a14:hiddenEffects xmlns:a14="http://schemas.microsoft.com/office/drawing/2010/main">
+                <a:effectLst>
+                  <a:outerShdw dist="35921" dir="2700000" algn="ctr" rotWithShape="0">
+                    <a:schemeClr val="bg2"/>
+                  </a:outerShdw>
+                </a:effectLst>
+              </a14:hiddenEffects>
+            </a:ext>
+          </a:extLst>
+        </p:spPr>
+      </p:pic>
     </p:spTree>
     <p:extLst>
       <p:ext uri="{BB962C8B-B14F-4D97-AF65-F5344CB8AC3E}">
@@ -10318,7 +11228,7 @@
         </p:nvSpPr>
         <p:spPr>
           <a:xfrm>
-            <a:off x="827584" y="1628800"/>
+            <a:off x="827584" y="1412776"/>
             <a:ext cx="7632848" cy="5170646"/>
           </a:xfrm>
           <a:prstGeom prst="rect">
@@ -10351,98 +11261,10 @@
                 <a:ea typeface="+mj-ea"/>
                 <a:cs typeface="+mj-cs"/>
               </a:rPr>
-              <a:t>共性：</a:t>
-            </a:r>
-            <a:endParaRPr lang="en-US" altLang="zh-CN" b="1" spc="50" dirty="0">
-              <a:ln w="12700">
-                <a:noFill/>
-                <a:prstDash val="solid"/>
-              </a:ln>
-              <a:solidFill>
-                <a:schemeClr val="accent4"/>
-              </a:solidFill>
-              <a:effectLst>
-                <a:outerShdw blurRad="38100" dist="38100" dir="2700000" algn="tl">
-                  <a:srgbClr val="000000">
-                    <a:alpha val="43137"/>
-                  </a:srgbClr>
-                </a:outerShdw>
-              </a:effectLst>
-              <a:latin typeface="+mj-lt"/>
-              <a:ea typeface="+mj-ea"/>
-              <a:cs typeface="+mj-cs"/>
-            </a:endParaRPr>
-          </a:p>
-          <a:p>
-            <a:endParaRPr lang="en-US" altLang="zh-CN" sz="1400" dirty="0" smtClean="0">
-              <a:solidFill>
-                <a:schemeClr val="accent4"/>
-              </a:solidFill>
-            </a:endParaRPr>
-          </a:p>
-          <a:p>
-            <a:r>
-              <a:rPr lang="en-US" altLang="zh-CN" sz="1400" dirty="0">
-                <a:solidFill>
-                  <a:schemeClr val="accent4"/>
-                </a:solidFill>
-              </a:rPr>
-              <a:t>	</a:t>
-            </a:r>
-            <a:r>
-              <a:rPr lang="zh-CN" altLang="en-US" sz="1400" dirty="0" smtClean="0">
-                <a:solidFill>
-                  <a:schemeClr val="accent4"/>
-                </a:solidFill>
-              </a:rPr>
-              <a:t>创建型，封装了对象的创建</a:t>
-            </a:r>
-            <a:endParaRPr lang="en-US" altLang="zh-CN" sz="1400" dirty="0" smtClean="0">
-              <a:solidFill>
-                <a:schemeClr val="accent4"/>
-              </a:solidFill>
-            </a:endParaRPr>
-          </a:p>
-          <a:p>
-            <a:r>
-              <a:rPr lang="en-US" altLang="zh-CN" sz="1400" dirty="0">
-                <a:solidFill>
-                  <a:schemeClr val="accent4"/>
-                </a:solidFill>
-              </a:rPr>
-              <a:t>	</a:t>
-            </a:r>
-            <a:r>
-              <a:rPr lang="zh-CN" altLang="en-US" sz="1400" dirty="0" smtClean="0">
-                <a:solidFill>
-                  <a:schemeClr val="accent4"/>
-                </a:solidFill>
-              </a:rPr>
-              <a:t>支持扩展新的产品</a:t>
-            </a:r>
-            <a:endParaRPr lang="en-US" altLang="zh-CN" sz="1400" dirty="0" smtClean="0">
-              <a:solidFill>
-                <a:schemeClr val="accent4"/>
-              </a:solidFill>
-            </a:endParaRPr>
-          </a:p>
-          <a:p>
-            <a:endParaRPr lang="en-US" altLang="zh-CN" sz="1400" dirty="0" smtClean="0">
-              <a:solidFill>
-                <a:schemeClr val="accent4"/>
-              </a:solidFill>
-            </a:endParaRPr>
-          </a:p>
-          <a:p>
-            <a:endParaRPr lang="zh-CN" altLang="en-US" sz="1400" dirty="0">
-              <a:solidFill>
-                <a:schemeClr val="accent4"/>
-              </a:solidFill>
-            </a:endParaRPr>
-          </a:p>
-          <a:p>
-            <a:r>
-              <a:rPr lang="zh-CN" altLang="en-US" b="1" spc="50" dirty="0">
+              <a:t>共性</a:t>
+            </a:r>
+            <a:r>
+              <a:rPr lang="zh-CN" altLang="en-US" b="1" spc="50" dirty="0" smtClean="0">
                 <a:ln w="12700">
                   <a:noFill/>
                   <a:prstDash val="solid"/>
@@ -10461,8 +11283,92 @@
                 <a:ea typeface="+mj-ea"/>
                 <a:cs typeface="+mj-cs"/>
               </a:rPr>
-              <a:t>差异</a:t>
-            </a:r>
+              <a:t>：</a:t>
+            </a:r>
+            <a:endParaRPr lang="en-US" altLang="zh-CN" sz="1400" dirty="0" smtClean="0">
+              <a:solidFill>
+                <a:schemeClr val="accent4"/>
+              </a:solidFill>
+            </a:endParaRPr>
+          </a:p>
+          <a:p>
+            <a:r>
+              <a:rPr lang="en-US" altLang="zh-CN" sz="1400" dirty="0">
+                <a:solidFill>
+                  <a:schemeClr val="accent4"/>
+                </a:solidFill>
+              </a:rPr>
+              <a:t>	</a:t>
+            </a:r>
+            <a:r>
+              <a:rPr lang="zh-CN" altLang="en-US" sz="1400" dirty="0" smtClean="0">
+                <a:solidFill>
+                  <a:schemeClr val="accent4"/>
+                </a:solidFill>
+              </a:rPr>
+              <a:t>创建型，封装了对象的创建</a:t>
+            </a:r>
+            <a:endParaRPr lang="en-US" altLang="zh-CN" sz="1400" dirty="0" smtClean="0">
+              <a:solidFill>
+                <a:schemeClr val="accent4"/>
+              </a:solidFill>
+            </a:endParaRPr>
+          </a:p>
+          <a:p>
+            <a:r>
+              <a:rPr lang="en-US" altLang="zh-CN" sz="1400" dirty="0">
+                <a:solidFill>
+                  <a:schemeClr val="accent4"/>
+                </a:solidFill>
+              </a:rPr>
+              <a:t>	</a:t>
+            </a:r>
+            <a:r>
+              <a:rPr lang="zh-CN" altLang="en-US" sz="1400" dirty="0" smtClean="0">
+                <a:solidFill>
+                  <a:schemeClr val="accent4"/>
+                </a:solidFill>
+              </a:rPr>
+              <a:t>支持扩展产品</a:t>
+            </a:r>
+            <a:r>
+              <a:rPr lang="en-US" altLang="zh-CN" sz="1400" dirty="0">
+                <a:solidFill>
+                  <a:schemeClr val="accent4"/>
+                </a:solidFill>
+              </a:rPr>
+              <a:t> </a:t>
+            </a:r>
+            <a:r>
+              <a:rPr lang="en-US" altLang="zh-CN" sz="1400" dirty="0" smtClean="0">
+                <a:solidFill>
+                  <a:schemeClr val="accent4"/>
+                </a:solidFill>
+              </a:rPr>
+              <a:t>/ </a:t>
+            </a:r>
+            <a:r>
+              <a:rPr lang="zh-CN" altLang="en-US" sz="1400" dirty="0" smtClean="0">
+                <a:solidFill>
+                  <a:schemeClr val="accent4"/>
+                </a:solidFill>
+              </a:rPr>
+              <a:t>产品系列</a:t>
+            </a:r>
+            <a:endParaRPr lang="en-US" altLang="zh-CN" sz="1400" dirty="0" smtClean="0">
+              <a:solidFill>
+                <a:schemeClr val="accent4"/>
+              </a:solidFill>
+            </a:endParaRPr>
+          </a:p>
+          <a:p>
+            <a:endParaRPr lang="zh-CN" altLang="en-US" sz="1400" dirty="0">
+              <a:solidFill>
+                <a:schemeClr val="accent4"/>
+              </a:solidFill>
+            </a:endParaRPr>
+          </a:p>
+          <a:p>
             <a:r>
               <a:rPr lang="zh-CN" altLang="en-US" b="1" spc="50" dirty="0">
                 <a:ln w="12700">
@@ -10483,29 +11389,30 @@
                 <a:ea typeface="+mj-ea"/>
                 <a:cs typeface="+mj-cs"/>
               </a:rPr>
+              <a:t>差异</a:t>
+            </a:r>
+            <a:r>
+              <a:rPr lang="zh-CN" altLang="en-US" b="1" spc="50" dirty="0" smtClean="0">
+                <a:ln w="12700">
+                  <a:noFill/>
+                  <a:prstDash val="solid"/>
+                </a:ln>
+                <a:solidFill>
+                  <a:schemeClr val="accent4"/>
+                </a:solidFill>
+                <a:effectLst>
+                  <a:outerShdw blurRad="38100" dist="38100" dir="2700000" algn="tl">
+                    <a:srgbClr val="000000">
+                      <a:alpha val="43137"/>
+                    </a:srgbClr>
+                  </a:outerShdw>
+                </a:effectLst>
+                <a:latin typeface="+mj-lt"/>
+                <a:ea typeface="+mj-ea"/>
+                <a:cs typeface="+mj-cs"/>
+              </a:rPr>
               <a:t>：</a:t>
             </a:r>
-            <a:endParaRPr lang="en-US" altLang="zh-CN" b="1" spc="50" dirty="0">
-              <a:ln w="12700">
-                <a:noFill/>
-                <a:prstDash val="solid"/>
-              </a:ln>
-              <a:solidFill>
-                <a:schemeClr val="accent4"/>
-              </a:solidFill>
-              <a:effectLst>
-                <a:outerShdw blurRad="38100" dist="38100" dir="2700000" algn="tl">
-                  <a:srgbClr val="000000">
-                    <a:alpha val="43137"/>
-                  </a:srgbClr>
-                </a:outerShdw>
-              </a:effectLst>
-              <a:latin typeface="+mj-lt"/>
-              <a:ea typeface="+mj-ea"/>
-              <a:cs typeface="+mj-cs"/>
-            </a:endParaRPr>
-          </a:p>
-          <a:p>
             <a:endParaRPr lang="en-US" altLang="zh-CN" sz="1400" dirty="0" smtClean="0">
               <a:solidFill>
                 <a:schemeClr val="accent4"/>
@@ -10573,7 +11480,7 @@
                   <a:schemeClr val="accent4"/>
                 </a:solidFill>
               </a:rPr>
-              <a:t>为创建对象提供一个统一的</a:t>
+              <a:t>为</a:t>
             </a:r>
             <a:r>
               <a:rPr lang="zh-CN" altLang="en-US" sz="1400" dirty="0" smtClean="0">
@@ -10581,6 +11488,22 @@
                   <a:schemeClr val="accent4"/>
                 </a:solidFill>
               </a:rPr>
+              <a:t>创建单个产品提供</a:t>
+            </a:r>
+            <a:r>
+              <a:rPr lang="zh-CN" altLang="en-US" sz="1400" dirty="0">
+                <a:solidFill>
+                  <a:schemeClr val="accent4"/>
+                </a:solidFill>
+              </a:rPr>
+              <a:t>一个统一的</a:t>
+            </a:r>
+            <a:r>
+              <a:rPr lang="zh-CN" altLang="en-US" sz="1400" dirty="0" smtClean="0">
+                <a:solidFill>
+                  <a:schemeClr val="accent4"/>
+                </a:solidFill>
+              </a:rPr>
               <a:t>接口</a:t>
             </a:r>
             <a:r>
@@ -10615,7 +11538,7 @@
                   <a:schemeClr val="accent4"/>
                 </a:solidFill>
               </a:rPr>
-              <a:t>对产品进行了抽象</a:t>
+              <a:t>对产品进行了抽象，支持单个产品的扩展</a:t>
             </a:r>
             <a:endParaRPr lang="en-US" altLang="zh-CN" sz="1400" dirty="0" smtClean="0">
               <a:solidFill>
@@ -10646,7 +11569,172 @@
                   <a:schemeClr val="accent4"/>
                 </a:solidFill>
               </a:rPr>
-              <a:t>产品构建过程不复杂</a:t>
+              <a:t>直接</a:t>
+            </a:r>
+            <a:r>
+              <a:rPr lang="zh-CN" altLang="en-US" sz="1400" dirty="0">
+                <a:solidFill>
+                  <a:schemeClr val="accent4"/>
+                </a:solidFill>
+              </a:rPr>
+              <a:t>返回</a:t>
+            </a:r>
+            <a:r>
+              <a:rPr lang="zh-CN" altLang="en-US" sz="1400" dirty="0" smtClean="0">
+                <a:solidFill>
+                  <a:schemeClr val="accent4"/>
+                </a:solidFill>
+              </a:rPr>
+              <a:t>创建的产品</a:t>
+            </a:r>
+            <a:endParaRPr lang="en-US" altLang="zh-CN" sz="1400" dirty="0">
+              <a:solidFill>
+                <a:schemeClr val="accent4"/>
+              </a:solidFill>
+            </a:endParaRPr>
+          </a:p>
+          <a:p>
+            <a:endParaRPr lang="en-US" altLang="zh-CN" sz="1400" dirty="0">
+              <a:solidFill>
+                <a:schemeClr val="accent4"/>
+              </a:solidFill>
+            </a:endParaRPr>
+          </a:p>
+          <a:p>
+            <a:r>
+              <a:rPr lang="en-US" altLang="zh-CN" sz="1400" dirty="0">
+                <a:solidFill>
+                  <a:schemeClr val="accent4"/>
+                </a:solidFill>
+              </a:rPr>
+              <a:t>	</a:t>
+            </a:r>
+            <a:r>
+              <a:rPr lang="en-US" altLang="zh-CN" sz="1400" b="1" dirty="0">
+                <a:solidFill>
+                  <a:schemeClr val="accent4"/>
+                </a:solidFill>
+              </a:rPr>
+              <a:t>Abstract </a:t>
+            </a:r>
+            <a:r>
+              <a:rPr lang="en-US" altLang="zh-CN" sz="1400" b="1" dirty="0" smtClean="0">
+                <a:solidFill>
+                  <a:schemeClr val="accent4"/>
+                </a:solidFill>
+              </a:rPr>
+              <a:t>Factory</a:t>
+            </a:r>
+            <a:br>
+              <a:rPr lang="en-US" altLang="zh-CN" sz="1400" b="1" dirty="0" smtClean="0">
+                <a:solidFill>
+                  <a:schemeClr val="accent4"/>
+                </a:solidFill>
+              </a:rPr>
+            </a:br>
+            <a:endParaRPr lang="en-US" altLang="zh-CN" sz="1400" b="1" dirty="0">
+              <a:solidFill>
+                <a:schemeClr val="accent4"/>
+              </a:solidFill>
+            </a:endParaRPr>
+          </a:p>
+          <a:p>
+            <a:r>
+              <a:rPr lang="en-US" altLang="zh-CN" sz="1400" dirty="0">
+                <a:solidFill>
+                  <a:schemeClr val="accent4"/>
+                </a:solidFill>
+              </a:rPr>
+              <a:t>	     - </a:t>
+            </a:r>
+            <a:r>
+              <a:rPr lang="zh-CN" altLang="en-US" sz="1400" dirty="0">
+                <a:solidFill>
+                  <a:schemeClr val="accent4"/>
+                </a:solidFill>
+              </a:rPr>
+              <a:t>强调创建一系列产品</a:t>
+            </a:r>
+            <a:r>
+              <a:rPr lang="en-US" altLang="zh-CN" sz="1400" dirty="0">
+                <a:solidFill>
+                  <a:schemeClr val="accent4"/>
+                </a:solidFill>
+              </a:rPr>
+              <a:t>(</a:t>
+            </a:r>
+            <a:r>
+              <a:rPr lang="zh-CN" altLang="en-US" sz="1400" dirty="0">
+                <a:solidFill>
+                  <a:schemeClr val="accent4"/>
+                </a:solidFill>
+              </a:rPr>
+              <a:t>简单或复杂</a:t>
+            </a:r>
+            <a:r>
+              <a:rPr lang="en-US" altLang="zh-CN" sz="1400" dirty="0">
+                <a:solidFill>
+                  <a:schemeClr val="accent4"/>
+                </a:solidFill>
+              </a:rPr>
+              <a:t>)</a:t>
+            </a:r>
+          </a:p>
+          <a:p>
+            <a:r>
+              <a:rPr lang="en-US" altLang="zh-CN" sz="1400" dirty="0">
+                <a:solidFill>
+                  <a:schemeClr val="accent4"/>
+                </a:solidFill>
+              </a:rPr>
+              <a:t>	     - </a:t>
+            </a:r>
+            <a:r>
+              <a:rPr lang="zh-CN" altLang="en-US" sz="1400" dirty="0">
+                <a:solidFill>
+                  <a:schemeClr val="accent4"/>
+                </a:solidFill>
+              </a:rPr>
+              <a:t>对一系列产品进行了</a:t>
+            </a:r>
+            <a:r>
+              <a:rPr lang="zh-CN" altLang="en-US" sz="1400" dirty="0" smtClean="0">
+                <a:solidFill>
+                  <a:schemeClr val="accent4"/>
+                </a:solidFill>
+              </a:rPr>
+              <a:t>抽象，支持一些列产品的扩展</a:t>
+            </a:r>
+            <a:endParaRPr lang="en-US" altLang="zh-CN" sz="1400" dirty="0">
+              <a:solidFill>
+                <a:schemeClr val="accent4"/>
+              </a:solidFill>
+            </a:endParaRPr>
+          </a:p>
+          <a:p>
+            <a:r>
+              <a:rPr lang="en-US" altLang="zh-CN" sz="1400" dirty="0">
+                <a:solidFill>
+                  <a:schemeClr val="accent4"/>
+                </a:solidFill>
+              </a:rPr>
+              <a:t>	     - </a:t>
+            </a:r>
+            <a:r>
+              <a:rPr lang="zh-CN" altLang="en-US" sz="1400" dirty="0">
+                <a:solidFill>
+                  <a:schemeClr val="accent4"/>
+                </a:solidFill>
+              </a:rPr>
+              <a:t>直接返回创建的</a:t>
+            </a:r>
+            <a:r>
+              <a:rPr lang="zh-CN" altLang="en-US" sz="1400" dirty="0" smtClean="0">
+                <a:solidFill>
+                  <a:schemeClr val="accent4"/>
+                </a:solidFill>
+              </a:rPr>
+              <a:t>产品</a:t>
             </a:r>
             <a:endParaRPr lang="en-US" altLang="zh-CN" sz="1400" dirty="0" smtClean="0">
               <a:solidFill>
@@ -10655,13 +11743,90 @@
             </a:endParaRPr>
           </a:p>
           <a:p>
+            <a:endParaRPr lang="en-US" altLang="zh-CN" sz="1400" dirty="0">
+              <a:solidFill>
+                <a:schemeClr val="accent4"/>
+              </a:solidFill>
+            </a:endParaRPr>
+          </a:p>
+          <a:p>
             <a:r>
               <a:rPr lang="en-US" altLang="zh-CN" sz="1400" dirty="0">
                 <a:solidFill>
                   <a:schemeClr val="accent4"/>
                 </a:solidFill>
               </a:rPr>
-              <a:t>	 </a:t>
+              <a:t>	</a:t>
+            </a:r>
+            <a:r>
+              <a:rPr lang="en-US" altLang="zh-CN" sz="1400" b="1" dirty="0" smtClean="0">
+                <a:solidFill>
+                  <a:schemeClr val="accent4"/>
+                </a:solidFill>
+              </a:rPr>
+              <a:t>Builder</a:t>
+            </a:r>
+            <a:br>
+              <a:rPr lang="en-US" altLang="zh-CN" sz="1400" b="1" dirty="0" smtClean="0">
+                <a:solidFill>
+                  <a:schemeClr val="accent4"/>
+                </a:solidFill>
+              </a:rPr>
+            </a:br>
+            <a:endParaRPr lang="en-US" altLang="zh-CN" sz="1400" b="1" dirty="0">
+              <a:solidFill>
+                <a:schemeClr val="accent4"/>
+              </a:solidFill>
+            </a:endParaRPr>
+          </a:p>
+          <a:p>
+            <a:r>
+              <a:rPr lang="en-US" altLang="zh-CN" sz="1400" dirty="0">
+                <a:solidFill>
+                  <a:schemeClr val="accent4"/>
+                </a:solidFill>
+              </a:rPr>
+              <a:t>	     - </a:t>
+            </a:r>
+            <a:r>
+              <a:rPr lang="zh-CN" altLang="en-US" sz="1400" dirty="0" smtClean="0">
+                <a:solidFill>
+                  <a:schemeClr val="accent4"/>
+                </a:solidFill>
+              </a:rPr>
+              <a:t>强调</a:t>
+            </a:r>
+            <a:r>
+              <a:rPr lang="zh-CN" altLang="en-US" sz="1400" dirty="0">
+                <a:solidFill>
+                  <a:schemeClr val="accent4"/>
+                </a:solidFill>
+              </a:rPr>
+              <a:t>一步一</a:t>
+            </a:r>
+            <a:r>
+              <a:rPr lang="zh-CN" altLang="en-US" sz="1400" dirty="0" smtClean="0">
+                <a:solidFill>
+                  <a:schemeClr val="accent4"/>
+                </a:solidFill>
+              </a:rPr>
+              <a:t>步的创建产品</a:t>
+            </a:r>
+            <a:r>
+              <a:rPr lang="zh-CN" altLang="en-US" sz="1400" dirty="0">
+                <a:solidFill>
+                  <a:schemeClr val="accent4"/>
+                </a:solidFill>
+              </a:rPr>
+              <a:t>，以及产品内部</a:t>
+            </a:r>
+            <a:r>
+              <a:rPr lang="zh-CN" altLang="en-US" sz="1400" dirty="0" smtClean="0">
+                <a:solidFill>
+                  <a:schemeClr val="accent4"/>
+                </a:solidFill>
+              </a:rPr>
+              <a:t>复杂性</a:t>
             </a:r>
             <a:r>
               <a:rPr lang="en-US" altLang="zh-CN" sz="1400" dirty="0" smtClean="0">
@@ -10669,7 +11834,7 @@
                   <a:schemeClr val="accent4"/>
                 </a:solidFill>
               </a:rPr>
-              <a:t>    - </a:t>
+              <a:t>&amp;</a:t>
             </a:r>
             <a:r>
               <a:rPr lang="zh-CN" altLang="en-US" sz="1400" dirty="0" smtClean="0">
@@ -10677,7 +11842,7 @@
                   <a:schemeClr val="accent4"/>
                 </a:solidFill>
               </a:rPr>
-              <a:t>直接</a:t>
+              <a:t>构建</a:t>
             </a:r>
             <a:r>
               <a:rPr lang="zh-CN" altLang="en-US" sz="1400" dirty="0">
@@ -10685,7 +11850,7 @@
                   <a:schemeClr val="accent4"/>
                 </a:solidFill>
               </a:rPr>
-              <a:t>返回</a:t>
+              <a:t>过程</a:t>
             </a:r>
             <a:r>
               <a:rPr lang="zh-CN" altLang="en-US" sz="1400" dirty="0" smtClean="0">
@@ -10693,7 +11858,7 @@
                   <a:schemeClr val="accent4"/>
                 </a:solidFill>
               </a:rPr>
-              <a:t>创建的产品</a:t>
+              <a:t>复杂性</a:t>
             </a:r>
             <a:endParaRPr lang="en-US" altLang="zh-CN" sz="1400" dirty="0" smtClean="0">
               <a:solidFill>
@@ -10702,6 +11867,30 @@
             </a:endParaRPr>
           </a:p>
           <a:p>
+            <a:r>
+              <a:rPr lang="en-US" altLang="zh-CN" sz="1400" dirty="0">
+                <a:solidFill>
+                  <a:schemeClr val="accent4"/>
+                </a:solidFill>
+              </a:rPr>
+              <a:t>	</a:t>
+            </a:r>
+            <a:r>
+              <a:rPr lang="en-US" altLang="zh-CN" sz="1400" dirty="0" smtClean="0">
+                <a:solidFill>
+                  <a:schemeClr val="accent4"/>
+                </a:solidFill>
+              </a:rPr>
+              <a:t>     - </a:t>
+            </a:r>
+            <a:r>
+              <a:rPr lang="zh-CN" altLang="en-US" sz="1400" dirty="0" smtClean="0">
+                <a:solidFill>
+                  <a:schemeClr val="accent4"/>
+                </a:solidFill>
+              </a:rPr>
+              <a:t>强调分离产品构建过程及其具体表示，相同的构建过程创建不同的表示</a:t>
+            </a:r>
             <a:endParaRPr lang="en-US" altLang="zh-CN" sz="1400" dirty="0" smtClean="0">
               <a:solidFill>
                 <a:schemeClr val="accent4"/>
@@ -10709,164 +11898,39 @@
             </a:endParaRPr>
           </a:p>
           <a:p>
-            <a:endParaRPr lang="en-US" altLang="zh-CN" sz="1400" dirty="0">
-              <a:solidFill>
-                <a:schemeClr val="accent4"/>
-              </a:solidFill>
-            </a:endParaRPr>
-          </a:p>
-          <a:p>
-            <a:r>
-              <a:rPr lang="en-US" altLang="zh-CN" sz="1400" dirty="0">
-                <a:solidFill>
-                  <a:schemeClr val="accent4"/>
-                </a:solidFill>
-              </a:rPr>
-              <a:t>	</a:t>
-            </a:r>
-            <a:r>
-              <a:rPr lang="en-US" altLang="zh-CN" sz="1400" b="1" dirty="0" smtClean="0">
+            <a:r>
+              <a:rPr lang="en-US" altLang="zh-CN" sz="1400" dirty="0" smtClean="0">
+                <a:solidFill>
+                  <a:schemeClr val="accent4"/>
+                </a:solidFill>
+              </a:rPr>
+              <a:t>	     - </a:t>
+            </a:r>
+            <a:r>
+              <a:rPr lang="zh-CN" altLang="en-US" sz="1400" dirty="0" smtClean="0">
+                <a:solidFill>
+                  <a:schemeClr val="accent4"/>
+                </a:solidFill>
+              </a:rPr>
+              <a:t>不要求对产品进行抽象，通过扩展</a:t>
+            </a:r>
+            <a:r>
+              <a:rPr lang="en-US" altLang="zh-CN" sz="1400" dirty="0" smtClean="0">
                 <a:solidFill>
                   <a:schemeClr val="accent4"/>
                 </a:solidFill>
               </a:rPr>
               <a:t>Builder</a:t>
             </a:r>
-          </a:p>
-          <a:p>
-            <a:endParaRPr lang="en-US" altLang="zh-CN" sz="1400" b="1" dirty="0">
-              <a:solidFill>
-                <a:schemeClr val="accent4"/>
-              </a:solidFill>
-            </a:endParaRPr>
-          </a:p>
-          <a:p>
-            <a:r>
-              <a:rPr lang="en-US" altLang="zh-CN" sz="1400" dirty="0">
-                <a:solidFill>
-                  <a:schemeClr val="accent4"/>
-                </a:solidFill>
-              </a:rPr>
-              <a:t>	     - </a:t>
-            </a:r>
             <a:r>
               <a:rPr lang="zh-CN" altLang="en-US" sz="1400" dirty="0" smtClean="0">
                 <a:solidFill>
                   <a:schemeClr val="accent4"/>
                 </a:solidFill>
               </a:rPr>
-              <a:t>强调</a:t>
-            </a:r>
-            <a:r>
-              <a:rPr lang="zh-CN" altLang="en-US" sz="1400" dirty="0">
-                <a:solidFill>
-                  <a:schemeClr val="accent4"/>
-                </a:solidFill>
-              </a:rPr>
-              <a:t>一步一</a:t>
-            </a:r>
-            <a:r>
-              <a:rPr lang="zh-CN" altLang="en-US" sz="1400" dirty="0" smtClean="0">
-                <a:solidFill>
-                  <a:schemeClr val="accent4"/>
-                </a:solidFill>
-              </a:rPr>
-              <a:t>步的创建产品</a:t>
+              <a:t>来改变产品的内部表示</a:t>
             </a:r>
             <a:endParaRPr lang="en-US" altLang="zh-CN" sz="1400" dirty="0" smtClean="0">
-              <a:solidFill>
-                <a:schemeClr val="accent4"/>
-              </a:solidFill>
-            </a:endParaRPr>
-          </a:p>
-          <a:p>
-            <a:r>
-              <a:rPr lang="en-US" altLang="zh-CN" sz="1400" dirty="0">
-                <a:solidFill>
-                  <a:schemeClr val="accent4"/>
-                </a:solidFill>
-              </a:rPr>
-              <a:t>	</a:t>
-            </a:r>
-            <a:r>
-              <a:rPr lang="en-US" altLang="zh-CN" sz="1400" dirty="0" smtClean="0">
-                <a:solidFill>
-                  <a:schemeClr val="accent4"/>
-                </a:solidFill>
-              </a:rPr>
-              <a:t>     - </a:t>
-            </a:r>
-            <a:r>
-              <a:rPr lang="zh-CN" altLang="en-US" sz="1400" dirty="0" smtClean="0">
-                <a:solidFill>
-                  <a:schemeClr val="accent4"/>
-                </a:solidFill>
-              </a:rPr>
-              <a:t>强调分离产品构建过程及其具体表示，相同的构建过程创建不同的表示</a:t>
-            </a:r>
-            <a:endParaRPr lang="en-US" altLang="zh-CN" sz="1400" dirty="0" smtClean="0">
-              <a:solidFill>
-                <a:schemeClr val="accent4"/>
-              </a:solidFill>
-            </a:endParaRPr>
-          </a:p>
-          <a:p>
-            <a:r>
-              <a:rPr lang="en-US" altLang="zh-CN" sz="1400" dirty="0">
-                <a:solidFill>
-                  <a:schemeClr val="accent4"/>
-                </a:solidFill>
-              </a:rPr>
-              <a:t>	</a:t>
-            </a:r>
-            <a:r>
-              <a:rPr lang="en-US" altLang="zh-CN" sz="1400" dirty="0" smtClean="0">
-                <a:solidFill>
-                  <a:schemeClr val="accent4"/>
-                </a:solidFill>
-              </a:rPr>
-              <a:t>     - </a:t>
-            </a:r>
-            <a:r>
-              <a:rPr lang="zh-CN" altLang="en-US" sz="1400" dirty="0" smtClean="0">
-                <a:solidFill>
-                  <a:schemeClr val="accent4"/>
-                </a:solidFill>
-              </a:rPr>
-              <a:t>产品内部复杂，构建过程复杂</a:t>
-            </a:r>
-            <a:endParaRPr lang="en-US" altLang="zh-CN" sz="1400" dirty="0" smtClean="0">
-              <a:solidFill>
-                <a:schemeClr val="accent4"/>
-              </a:solidFill>
-            </a:endParaRPr>
-          </a:p>
-          <a:p>
-            <a:r>
-              <a:rPr lang="en-US" altLang="zh-CN" sz="1400" dirty="0">
-                <a:solidFill>
-                  <a:schemeClr val="accent4"/>
-                </a:solidFill>
-              </a:rPr>
-              <a:t>	</a:t>
-            </a:r>
-            <a:r>
-              <a:rPr lang="en-US" altLang="zh-CN" sz="1400" dirty="0" smtClean="0">
-                <a:solidFill>
-                  <a:schemeClr val="accent4"/>
-                </a:solidFill>
-              </a:rPr>
-              <a:t>     - </a:t>
-            </a:r>
-            <a:r>
-              <a:rPr lang="zh-CN" altLang="en-US" sz="1400" dirty="0" smtClean="0">
-                <a:solidFill>
-                  <a:schemeClr val="accent4"/>
-                </a:solidFill>
-              </a:rPr>
-              <a:t>不要求对产品进行抽象</a:t>
-            </a:r>
-            <a:endParaRPr lang="en-US" altLang="zh-CN" sz="1400" dirty="0">
               <a:solidFill>
                 <a:schemeClr val="accent4"/>
               </a:solidFill>
@@ -10977,7 +12041,7 @@
           <a:p>
             <a:r>
               <a:rPr lang="en-US" altLang="zh-CN" dirty="0" smtClean="0"/>
-              <a:t>Builder VS. Factory Method</a:t>
+              <a:t>Difference</a:t>
             </a:r>
             <a:endParaRPr lang="zh-CN" altLang="en-US" dirty="0"/>
           </a:p>
@@ -11062,8 +12126,8 @@
         </p:nvSpPr>
         <p:spPr>
           <a:xfrm>
-            <a:off x="1475656" y="1412776"/>
-            <a:ext cx="6336704" cy="5035698"/>
+            <a:off x="683568" y="1412776"/>
+            <a:ext cx="7632848" cy="5035698"/>
           </a:xfrm>
           <a:prstGeom prst="rect">
             <a:avLst/>
@@ -11246,7 +12310,7 @@
                 <a:effectLst/>
                 <a:latin typeface="+mn-ea"/>
               </a:rPr>
-              <a:t>Builder VS. Builder</a:t>
+              <a:t>Builder / Factory Method / Abstract Factory</a:t>
             </a:r>
             <a:endParaRPr lang="zh-CN" altLang="en-US" sz="2400" dirty="0">
               <a:solidFill>
@@ -11332,52 +12396,6 @@
           </a:p>
         </p:txBody>
       </p:sp>
-      <p:sp>
-        <p:nvSpPr>
-          <p:cNvPr id="3" name="Rectangle 2"/>
-          <p:cNvSpPr txBox="1">
-            <a:spLocks noChangeArrowheads="1"/>
-          </p:cNvSpPr>
-          <p:nvPr/>
-        </p:nvSpPr>
-        <p:spPr>
-          <a:xfrm>
-            <a:off x="628650" y="44624"/>
-            <a:ext cx="7886700" cy="1119658"/>
-          </a:xfrm>
-          <a:prstGeom prst="rect">
-            <a:avLst/>
-          </a:prstGeom>
-        </p:spPr>
-        <p:txBody>
-          <a:bodyPr vert="horz" lIns="91440" tIns="45720" rIns="91440" bIns="45720" rtlCol="0" anchor="ctr">
-            <a:normAutofit/>
-          </a:bodyPr>
-          <a:lstStyle>
-            <a:lvl1pPr algn="ctr" defTabSz="914400" rtl="0" eaLnBrk="1" latinLnBrk="0" hangingPunct="1">
-              <a:spcBef>
-                <a:spcPct val="0"/>
-              </a:spcBef>
-              <a:buNone/>
-              <a:defRPr sz="4400" kern="1200">
-                <a:solidFill>
-                  <a:schemeClr val="tx1"/>
-                </a:solidFill>
-                <a:latin typeface="+mj-lt"/>
-                <a:ea typeface="+mj-ea"/>
-                <a:cs typeface="+mj-cs"/>
-              </a:defRPr>
-            </a:lvl1pPr>
-          </a:lstStyle>
-          <a:p>
-            <a:r>
-              <a:rPr lang="en-US" altLang="zh-CN" smtClean="0"/>
-              <a:t>Builder</a:t>
-            </a:r>
-            <a:endParaRPr lang="zh-CN" altLang="en-US" dirty="0"/>
-          </a:p>
-        </p:txBody>
-      </p:sp>
     </p:spTree>
     <p:extLst>
       <p:ext uri="{BB962C8B-B14F-4D97-AF65-F5344CB8AC3E}">
@@ -11445,52 +12463,6 @@
               </a:rPr>
               <a:t>You!</a:t>
             </a:r>
-          </a:p>
-        </p:txBody>
-      </p:sp>
-      <p:sp>
-        <p:nvSpPr>
-          <p:cNvPr id="3" name="Rectangle 2"/>
-          <p:cNvSpPr txBox="1">
-            <a:spLocks noChangeArrowheads="1"/>
-          </p:cNvSpPr>
-          <p:nvPr/>
-        </p:nvSpPr>
-        <p:spPr>
-          <a:xfrm>
-            <a:off x="628650" y="44624"/>
-            <a:ext cx="7886700" cy="1119658"/>
-          </a:xfrm>
-          <a:prstGeom prst="rect">
-            <a:avLst/>
-          </a:prstGeom>
-        </p:spPr>
-        <p:txBody>
-          <a:bodyPr vert="horz" lIns="91440" tIns="45720" rIns="91440" bIns="45720" rtlCol="0" anchor="ctr">
-            <a:normAutofit/>
-          </a:bodyPr>
-          <a:lstStyle>
-            <a:lvl1pPr algn="ctr" defTabSz="914400" rtl="0" eaLnBrk="1" latinLnBrk="0" hangingPunct="1">
-              <a:spcBef>
-                <a:spcPct val="0"/>
-              </a:spcBef>
-              <a:buNone/>
-              <a:defRPr sz="4400" kern="1200">
-                <a:solidFill>
-                  <a:schemeClr val="tx1"/>
-                </a:solidFill>
-                <a:latin typeface="+mj-lt"/>
-                <a:ea typeface="+mj-ea"/>
-                <a:cs typeface="+mj-cs"/>
-              </a:defRPr>
-            </a:lvl1pPr>
-          </a:lstStyle>
-          <a:p>
-            <a:r>
-              <a:rPr lang="en-US" altLang="zh-CN" smtClean="0"/>
-              <a:t>Builder</a:t>
-            </a:r>
-            <a:endParaRPr lang="zh-CN" altLang="en-US" dirty="0"/>
           </a:p>
         </p:txBody>
       </p:sp>
@@ -13079,13 +14051,7 @@
               <a:rPr lang="zh-CN" altLang="en-US" sz="2700" b="1" dirty="0">
                 <a:effectLst/>
               </a:rPr>
-              <a:t>需求</a:t>
-            </a:r>
-            <a:r>
-              <a:rPr lang="zh-CN" altLang="en-US" sz="2700" b="1" dirty="0">
-                <a:effectLst/>
-              </a:rPr>
-              <a:t>：</a:t>
+              <a:t>需求：</a:t>
             </a:r>
             <a:endParaRPr lang="en-US" altLang="zh-CN" sz="2700" b="1" dirty="0">
               <a:effectLst/>
@@ -13156,13 +14122,7 @@
               <a:rPr lang="zh-CN" altLang="en-US" sz="1900" dirty="0" smtClean="0">
                 <a:effectLst/>
               </a:rPr>
-              <a:t>电脑（家用</a:t>
-            </a:r>
-            <a:r>
-              <a:rPr lang="zh-CN" altLang="en-US" sz="1900" dirty="0" smtClean="0">
-                <a:effectLst/>
-              </a:rPr>
-              <a:t>级</a:t>
+              <a:t>电脑（家用级</a:t>
             </a:r>
             <a:r>
               <a:rPr lang="en-US" altLang="zh-CN" sz="1900" dirty="0" smtClean="0">
@@ -13215,13 +14175,7 @@
               <a:rPr lang="zh-CN" altLang="en-US" sz="1900" dirty="0" smtClean="0">
                 <a:effectLst/>
               </a:rPr>
-              <a:t>同一种级别的</a:t>
-            </a:r>
-            <a:r>
-              <a:rPr lang="zh-CN" altLang="en-US" sz="1900" dirty="0" smtClean="0">
-                <a:effectLst/>
-              </a:rPr>
-              <a:t>电脑可能有多个推荐，如：</a:t>
+              <a:t>同一种级别的电脑可能有多个推荐，如：</a:t>
             </a:r>
             <a:r>
               <a:rPr lang="en-US" altLang="zh-CN" sz="1900" dirty="0" smtClean="0">
@@ -13278,13 +14232,7 @@
               <a:rPr lang="zh-CN" altLang="en-US" sz="1900" dirty="0" smtClean="0">
                 <a:effectLst/>
               </a:rPr>
-              <a:t>个游戏</a:t>
-            </a:r>
-            <a:r>
-              <a:rPr lang="zh-CN" altLang="en-US" sz="1900" dirty="0" smtClean="0">
-                <a:effectLst/>
-              </a:rPr>
-              <a:t>级 </a:t>
+              <a:t>个游戏级 </a:t>
             </a:r>
             <a:r>
               <a:rPr lang="en-US" altLang="zh-CN" sz="1900" dirty="0" smtClean="0">
@@ -13357,6 +14305,61 @@
               </a:rPr>
               <a:t>)</a:t>
             </a:r>
+          </a:p>
+          <a:p>
+            <a:r>
+              <a:rPr lang="en-US" altLang="zh-CN" sz="1900" dirty="0">
+                <a:effectLst/>
+              </a:rPr>
+              <a:t>	</a:t>
+            </a:r>
+            <a:r>
+              <a:rPr lang="en-US" altLang="zh-CN" sz="1900" dirty="0" smtClean="0">
+                <a:effectLst/>
+              </a:rPr>
+              <a:t>	1</a:t>
+            </a:r>
+            <a:r>
+              <a:rPr lang="zh-CN" altLang="en-US" sz="1900" dirty="0" smtClean="0">
+                <a:effectLst/>
+              </a:rPr>
+              <a:t>个发烧级 </a:t>
+            </a:r>
+            <a:r>
+              <a:rPr lang="en-US" altLang="zh-CN" sz="1900" dirty="0" smtClean="0">
+                <a:effectLst/>
+              </a:rPr>
+              <a:t>(</a:t>
+            </a:r>
+            <a:r>
+              <a:rPr lang="zh-CN" altLang="en-US" sz="1900" dirty="0" smtClean="0">
+                <a:effectLst/>
+              </a:rPr>
+              <a:t>专业显卡、</a:t>
+            </a:r>
+            <a:r>
+              <a:rPr lang="en-US" altLang="zh-CN" sz="1900" dirty="0" smtClean="0">
+                <a:effectLst/>
+              </a:rPr>
+              <a:t>8X8G</a:t>
+            </a:r>
+            <a:r>
+              <a:rPr lang="zh-CN" altLang="en-US" sz="1900" dirty="0" smtClean="0">
+                <a:effectLst/>
+              </a:rPr>
+              <a:t>内存</a:t>
+            </a:r>
+            <a:r>
+              <a:rPr lang="en-US" altLang="zh-CN" sz="1900" dirty="0" smtClean="0">
+                <a:effectLst/>
+              </a:rPr>
+              <a:t>)</a:t>
+            </a:r>
+            <a:endParaRPr lang="en-US" altLang="zh-CN" sz="1900" dirty="0">
+              <a:effectLst/>
+            </a:endParaRPr>
+          </a:p>
+          <a:p>
             <a:endParaRPr lang="en-US" altLang="zh-CN" sz="1900" dirty="0" smtClean="0">
               <a:effectLst/>
             </a:endParaRPr>
@@ -13369,170 +14372,82 @@
               <a:t>	</a:t>
             </a:r>
             <a:r>
+              <a:rPr lang="zh-CN" altLang="en-US" sz="1900" dirty="0" smtClean="0">
+                <a:effectLst/>
+              </a:rPr>
+              <a:t>当选择某个特定</a:t>
+            </a:r>
+            <a:r>
               <a:rPr lang="en-US" altLang="zh-CN" sz="1900" dirty="0" smtClean="0">
                 <a:effectLst/>
               </a:rPr>
-              <a:t>	1</a:t>
+              <a:t>DIY</a:t>
             </a:r>
             <a:r>
               <a:rPr lang="zh-CN" altLang="en-US" sz="1900" dirty="0" smtClean="0">
                 <a:effectLst/>
               </a:rPr>
-              <a:t>个发烧</a:t>
+              <a:t>电脑时，弹窗显示该</a:t>
+            </a:r>
+            <a:r>
+              <a:rPr lang="en-US" altLang="zh-CN" sz="1900" dirty="0" smtClean="0">
+                <a:effectLst/>
+              </a:rPr>
+              <a:t>DIY</a:t>
             </a:r>
             <a:r>
               <a:rPr lang="zh-CN" altLang="en-US" sz="1900" dirty="0" smtClean="0">
                 <a:effectLst/>
               </a:rPr>
-              <a:t>级 </a:t>
-            </a:r>
-            <a:r>
-              <a:rPr lang="en-US" altLang="zh-CN" sz="1900" dirty="0" smtClean="0">
-                <a:effectLst/>
-              </a:rPr>
-              <a:t>(</a:t>
-            </a:r>
-            <a:r>
-              <a:rPr lang="zh-CN" altLang="en-US" sz="1900" dirty="0" smtClean="0">
-                <a:effectLst/>
-              </a:rPr>
-              <a:t>专业显卡、</a:t>
-            </a:r>
-            <a:r>
-              <a:rPr lang="en-US" altLang="zh-CN" sz="1900" dirty="0" smtClean="0">
-                <a:effectLst/>
-              </a:rPr>
-              <a:t>8X</a:t>
-            </a:r>
-            <a:r>
-              <a:rPr lang="en-US" altLang="zh-CN" sz="1900" dirty="0" smtClean="0">
-                <a:effectLst/>
-              </a:rPr>
-              <a:t>8G</a:t>
-            </a:r>
-            <a:r>
-              <a:rPr lang="zh-CN" altLang="en-US" sz="1900" dirty="0" smtClean="0">
-                <a:effectLst/>
-              </a:rPr>
-              <a:t>内存</a:t>
-            </a:r>
-            <a:r>
-              <a:rPr lang="en-US" altLang="zh-CN" sz="1900" dirty="0" smtClean="0">
-                <a:effectLst/>
-              </a:rPr>
-              <a:t>)</a:t>
-            </a:r>
-            <a:endParaRPr lang="en-US" altLang="zh-CN" sz="1900" dirty="0">
-              <a:effectLst/>
-            </a:endParaRPr>
-          </a:p>
-          <a:p>
+              <a:t>电脑的价格、部件概要信息、详细属性列表等信息</a:t>
+            </a:r>
             <a:endParaRPr lang="en-US" altLang="zh-CN" sz="1900" dirty="0" smtClean="0">
               <a:effectLst/>
             </a:endParaRPr>
           </a:p>
           <a:p>
             <a:r>
+              <a:rPr lang="en-US" altLang="zh-CN" sz="1900" b="1" dirty="0">
+                <a:effectLst/>
+              </a:rPr>
+              <a:t>	</a:t>
+            </a:r>
+            <a:r>
               <a:rPr lang="en-US" altLang="zh-CN" sz="1900" dirty="0">
                 <a:effectLst/>
               </a:rPr>
-              <a:t>	</a:t>
+              <a:t> DIY</a:t>
+            </a:r>
+            <a:r>
+              <a:rPr lang="zh-CN" altLang="en-US" sz="1900" dirty="0">
+                <a:effectLst/>
+              </a:rPr>
+              <a:t>电脑</a:t>
             </a:r>
             <a:r>
               <a:rPr lang="zh-CN" altLang="en-US" sz="1900" dirty="0" smtClean="0">
                 <a:effectLst/>
               </a:rPr>
-              <a:t>当选择某个特定</a:t>
+              <a:t>本身内部的相同种类的部件之间可能存在很大差异，如</a:t>
             </a:r>
             <a:r>
               <a:rPr lang="en-US" altLang="zh-CN" sz="1900" dirty="0" smtClean="0">
                 <a:effectLst/>
               </a:rPr>
-              <a:t>DIY</a:t>
-            </a:r>
-            <a:r>
-              <a:rPr lang="zh-CN" altLang="en-US" sz="1900" dirty="0" smtClean="0">
-                <a:effectLst/>
-              </a:rPr>
-              <a:t>电脑时，</a:t>
-            </a:r>
-            <a:r>
-              <a:rPr lang="zh-CN" altLang="en-US" sz="1900" dirty="0" smtClean="0">
-                <a:effectLst/>
-              </a:rPr>
-              <a:t>弹窗显示</a:t>
-            </a:r>
-            <a:r>
-              <a:rPr lang="zh-CN" altLang="en-US" sz="1900" dirty="0" smtClean="0">
-                <a:effectLst/>
-              </a:rPr>
-              <a:t>该</a:t>
-            </a:r>
-            <a:r>
-              <a:rPr lang="en-US" altLang="zh-CN" sz="1900" dirty="0" smtClean="0">
-                <a:effectLst/>
-              </a:rPr>
-              <a:t>DIY</a:t>
-            </a:r>
-            <a:r>
-              <a:rPr lang="zh-CN" altLang="en-US" sz="1900" dirty="0" smtClean="0">
-                <a:effectLst/>
-              </a:rPr>
-              <a:t>电脑的价格、部件概要信息、详细属性列表等信息</a:t>
-            </a:r>
+              <a:t>CPU:</a:t>
+            </a:r>
+          </a:p>
+          <a:p>
             <a:endParaRPr lang="en-US" altLang="zh-CN" sz="1900" dirty="0" smtClean="0">
               <a:effectLst/>
             </a:endParaRPr>
           </a:p>
           <a:p>
             <a:r>
-              <a:rPr lang="en-US" altLang="zh-CN" sz="1900" b="1" dirty="0">
-                <a:effectLst/>
-              </a:rPr>
-              <a:t>	</a:t>
-            </a:r>
-            <a:r>
               <a:rPr lang="en-US" altLang="zh-CN" sz="1900" dirty="0">
                 <a:effectLst/>
               </a:rPr>
-              <a:t> DIY</a:t>
-            </a:r>
-            <a:r>
-              <a:rPr lang="zh-CN" altLang="en-US" sz="1900" dirty="0">
-                <a:effectLst/>
-              </a:rPr>
-              <a:t>电脑</a:t>
-            </a:r>
-            <a:r>
-              <a:rPr lang="zh-CN" altLang="en-US" sz="1900" dirty="0" smtClean="0">
-                <a:effectLst/>
-              </a:rPr>
-              <a:t>本身内部的相同种类的部件之间可能存在很大差异，如</a:t>
-            </a:r>
-            <a:r>
-              <a:rPr lang="en-US" altLang="zh-CN" sz="1900" dirty="0" smtClean="0">
-                <a:effectLst/>
-              </a:rPr>
-              <a:t>CPU:</a:t>
-            </a:r>
-          </a:p>
-          <a:p>
-            <a:endParaRPr lang="en-US" altLang="zh-CN" sz="1900" dirty="0" smtClean="0">
-              <a:effectLst/>
-            </a:endParaRPr>
-          </a:p>
-          <a:p>
-            <a:r>
-              <a:rPr lang="en-US" altLang="zh-CN" sz="1900" dirty="0">
-                <a:effectLst/>
-              </a:rPr>
-              <a:t>	</a:t>
-            </a:r>
-            <a:r>
-              <a:rPr lang="en-US" altLang="zh-CN" sz="1900" dirty="0">
-                <a:effectLst/>
-              </a:rPr>
-              <a:t>	Intel Core i3-4160:</a:t>
+              <a:t>		Intel Core i3-4160:</a:t>
             </a:r>
             <a:r>
               <a:rPr lang="en-US" altLang="zh-CN" sz="1900" dirty="0" smtClean="0">
@@ -15709,7 +16624,6 @@
                   <a:rPr lang="en-US" altLang="zh-CN" sz="800" dirty="0" smtClean="0"/>
                   <a:t>4400</a:t>
                 </a:r>
-                <a:endParaRPr lang="en-US" altLang="zh-CN" sz="800" dirty="0" smtClean="0"/>
               </a:p>
             </p:txBody>
           </p:sp>
@@ -15744,7 +16658,6 @@
                 <a:rPr lang="en-US" altLang="zh-CN" sz="800" dirty="0" smtClean="0"/>
                 <a:t>M</a:t>
               </a:r>
-              <a:endParaRPr lang="en-US" altLang="zh-CN" sz="800" dirty="0" smtClean="0"/>
             </a:p>
           </p:txBody>
         </p:sp>
@@ -16292,13 +17205,7 @@
               <a:rPr lang="en-US" altLang="zh-CN" sz="1900" dirty="0" smtClean="0">
                 <a:effectLst/>
               </a:rPr>
-              <a:t>	</a:t>
-            </a:r>
-            <a:r>
-              <a:rPr lang="en-US" altLang="zh-CN" sz="1900" dirty="0" smtClean="0">
-                <a:effectLst/>
-              </a:rPr>
-              <a:t>Computer</a:t>
+              <a:t>	Computer</a:t>
             </a:r>
             <a:r>
               <a:rPr lang="zh-CN" altLang="en-US" sz="1900" dirty="0" smtClean="0">
@@ -16350,33 +17257,21 @@
               <a:rPr lang="en-US" altLang="zh-CN" sz="1900" dirty="0" smtClean="0">
                 <a:effectLst/>
               </a:rPr>
+              <a:t>	CPU / Memory / Graphic Card / Mainboard / </a:t>
+            </a:r>
+          </a:p>
+          <a:p>
+            <a:r>
+              <a:rPr lang="en-US" altLang="zh-CN" sz="1900" dirty="0">
+                <a:effectLst/>
+              </a:rPr>
               <a:t>	</a:t>
             </a:r>
             <a:r>
               <a:rPr lang="en-US" altLang="zh-CN" sz="1900" dirty="0" smtClean="0">
                 <a:effectLst/>
               </a:rPr>
-              <a:t>CPU / Memory / Graphic Card / Mainboard / </a:t>
-            </a:r>
-          </a:p>
-          <a:p>
-            <a:r>
-              <a:rPr lang="en-US" altLang="zh-CN" sz="1900" dirty="0">
-                <a:effectLst/>
-              </a:rPr>
-              <a:t>	</a:t>
-            </a:r>
-            <a:r>
-              <a:rPr lang="en-US" altLang="zh-CN" sz="1900" dirty="0" smtClean="0">
-                <a:effectLst/>
-              </a:rPr>
-              <a:t>	</a:t>
-            </a:r>
-            <a:r>
-              <a:rPr lang="en-US" altLang="zh-CN" sz="1900" dirty="0" smtClean="0">
-                <a:effectLst/>
-              </a:rPr>
-              <a:t>Disk / Power / Monitor / Mouse / Keyboard…</a:t>
+              <a:t>	Disk / Power / Monitor / Mouse / Keyboard…</a:t>
             </a:r>
           </a:p>
           <a:p>
@@ -16411,13 +17306,7 @@
               <a:rPr lang="en-US" altLang="zh-CN" sz="1900" dirty="0" smtClean="0">
                 <a:effectLst/>
               </a:rPr>
-              <a:t>	</a:t>
-            </a:r>
-            <a:r>
-              <a:rPr lang="en-US" altLang="zh-CN" sz="1900" dirty="0" smtClean="0">
-                <a:effectLst/>
-              </a:rPr>
-              <a:t>	Intel CPU / AMD CPU</a:t>
+              <a:t>		Intel CPU / AMD CPU</a:t>
             </a:r>
           </a:p>
           <a:p>
@@ -16671,13 +17560,7 @@
               <a:rPr lang="zh-CN" altLang="en-US" sz="2700" b="1" dirty="0">
                 <a:effectLst/>
               </a:rPr>
-              <a:t>设计</a:t>
-            </a:r>
-            <a:r>
-              <a:rPr lang="zh-CN" altLang="en-US" sz="2700" b="1" dirty="0">
-                <a:effectLst/>
-              </a:rPr>
-              <a:t>：</a:t>
+              <a:t>设计：</a:t>
             </a:r>
             <a:r>
               <a:rPr lang="en-US" altLang="zh-CN" sz="2600" dirty="0">
@@ -16697,13 +17580,7 @@
               <a:rPr lang="zh-CN" altLang="en-US" sz="1900" dirty="0" smtClean="0">
                 <a:effectLst/>
               </a:rPr>
-              <a:t>无法</a:t>
-            </a:r>
-            <a:r>
-              <a:rPr lang="zh-CN" altLang="en-US" sz="1900" dirty="0" smtClean="0">
-                <a:effectLst/>
-              </a:rPr>
-              <a:t>抽象</a:t>
+              <a:t>无法抽象</a:t>
             </a:r>
             <a:r>
               <a:rPr lang="en-US" altLang="zh-CN" sz="1900" dirty="0" smtClean="0">
@@ -17115,18 +17992,6 @@
               </a:rPr>
               <a:t>WebPage_ComputerGameLevel001</a:t>
             </a:r>
-            <a:endParaRPr lang="en-US" altLang="en-US" sz="1700" b="1" spc="50" dirty="0">
-              <a:ln w="12700">
-                <a:noFill/>
-                <a:prstDash val="solid"/>
-              </a:ln>
-              <a:solidFill>
-                <a:schemeClr val="accent4"/>
-              </a:solidFill>
-              <a:latin typeface="+mj-lt"/>
-              <a:ea typeface="+mj-ea"/>
-              <a:cs typeface="+mj-cs"/>
-            </a:endParaRPr>
           </a:p>
         </p:txBody>
       </p:sp>
@@ -17552,18 +18417,6 @@
               </a:rPr>
               <a:t>WebPage_ComputerGameLevel001</a:t>
             </a:r>
-            <a:endParaRPr lang="en-US" altLang="en-US" sz="1700" b="1" spc="50" dirty="0">
-              <a:ln w="12700">
-                <a:noFill/>
-                <a:prstDash val="solid"/>
-              </a:ln>
-              <a:solidFill>
-                <a:schemeClr val="accent4"/>
-              </a:solidFill>
-              <a:latin typeface="+mj-lt"/>
-              <a:ea typeface="+mj-ea"/>
-              <a:cs typeface="+mj-cs"/>
-            </a:endParaRPr>
           </a:p>
         </p:txBody>
       </p:sp>

</xml_diff>